<commit_message>
Modification de tous les livrables: 8/04/21
</commit_message>
<xml_diff>
--- a/P4_02_Roadmap_RepAero.pptx
+++ b/P4_02_Roadmap_RepAero.pptx
@@ -6,8 +6,6 @@
   </p:sldMasterIdLst>
   <p:sldIdLst>
     <p:sldId id="256" r:id="rId3"/>
-    <p:sldId id="257" r:id="rId4"/>
-    <p:sldId id="258" r:id="rId5"/>
   </p:sldIdLst>
   <p:sldSz cx="12192000" cy="6858000"/>
   <p:notesSz cx="7559675" cy="10691812"/>
@@ -66,7 +64,7 @@
         <p:spPr>
           <a:xfrm>
             <a:off x="1261800" y="365760"/>
-            <a:ext cx="9691560" cy="1324440"/>
+            <a:ext cx="9691200" cy="1324080"/>
           </a:xfrm>
           <a:prstGeom prst="rect">
             <a:avLst/>
@@ -179,7 +177,7 @@
         <p:spPr>
           <a:xfrm>
             <a:off x="1261800" y="365760"/>
-            <a:ext cx="9691560" cy="1324440"/>
+            <a:ext cx="9691200" cy="1324080"/>
           </a:xfrm>
           <a:prstGeom prst="rect">
             <a:avLst/>
@@ -352,7 +350,7 @@
         <p:spPr>
           <a:xfrm>
             <a:off x="1261800" y="365760"/>
-            <a:ext cx="9691560" cy="1324440"/>
+            <a:ext cx="9691200" cy="1324080"/>
           </a:xfrm>
           <a:prstGeom prst="rect">
             <a:avLst/>
@@ -585,7 +583,7 @@
         <p:spPr>
           <a:xfrm>
             <a:off x="1261800" y="365760"/>
-            <a:ext cx="9691560" cy="1324440"/>
+            <a:ext cx="9691200" cy="1324080"/>
           </a:xfrm>
           <a:prstGeom prst="rect">
             <a:avLst/>
@@ -669,7 +667,7 @@
         <p:spPr>
           <a:xfrm>
             <a:off x="1261800" y="365760"/>
-            <a:ext cx="9691560" cy="1324440"/>
+            <a:ext cx="9691200" cy="1324080"/>
           </a:xfrm>
           <a:prstGeom prst="rect">
             <a:avLst/>
@@ -752,7 +750,7 @@
         <p:spPr>
           <a:xfrm>
             <a:off x="1261800" y="365760"/>
-            <a:ext cx="9691560" cy="1324440"/>
+            <a:ext cx="9691200" cy="1324080"/>
           </a:xfrm>
           <a:prstGeom prst="rect">
             <a:avLst/>
@@ -865,7 +863,7 @@
         <p:spPr>
           <a:xfrm>
             <a:off x="1261800" y="365760"/>
-            <a:ext cx="9691560" cy="1324440"/>
+            <a:ext cx="9691200" cy="1324080"/>
           </a:xfrm>
           <a:prstGeom prst="rect">
             <a:avLst/>
@@ -918,7 +916,7 @@
         <p:spPr>
           <a:xfrm>
             <a:off x="1261800" y="365760"/>
-            <a:ext cx="9691560" cy="6140520"/>
+            <a:ext cx="9691200" cy="6139080"/>
           </a:xfrm>
           <a:prstGeom prst="rect">
             <a:avLst/>
@@ -971,7 +969,7 @@
         <p:spPr>
           <a:xfrm>
             <a:off x="1261800" y="365760"/>
-            <a:ext cx="9691560" cy="1324440"/>
+            <a:ext cx="9691200" cy="1324080"/>
           </a:xfrm>
           <a:prstGeom prst="rect">
             <a:avLst/>
@@ -1114,7 +1112,7 @@
         <p:spPr>
           <a:xfrm>
             <a:off x="1261800" y="365760"/>
-            <a:ext cx="9691560" cy="1324440"/>
+            <a:ext cx="9691200" cy="1324080"/>
           </a:xfrm>
           <a:prstGeom prst="rect">
             <a:avLst/>
@@ -1257,7 +1255,7 @@
         <p:spPr>
           <a:xfrm>
             <a:off x="1261800" y="365760"/>
-            <a:ext cx="9691560" cy="1324440"/>
+            <a:ext cx="9691200" cy="1324080"/>
           </a:xfrm>
           <a:prstGeom prst="rect">
             <a:avLst/>
@@ -1407,7 +1405,7 @@
         <p:spPr>
           <a:xfrm>
             <a:off x="1261800" y="365760"/>
-            <a:ext cx="9691560" cy="1324440"/>
+            <a:ext cx="9691200" cy="1324080"/>
           </a:xfrm>
           <a:prstGeom prst="rect">
             <a:avLst/>
@@ -1656,7 +1654,7 @@
         <p:spPr>
           <a:xfrm>
             <a:off x="1259640" y="1800000"/>
-            <a:ext cx="10800000" cy="1619280"/>
+            <a:ext cx="10799640" cy="1618920"/>
           </a:xfrm>
           <a:prstGeom prst="rect">
             <a:avLst/>
@@ -1694,7 +1692,7 @@
         <p:spPr>
           <a:xfrm>
             <a:off x="63360" y="4860000"/>
-            <a:ext cx="11996280" cy="617760"/>
+            <a:ext cx="11995920" cy="617400"/>
           </a:xfrm>
           <a:prstGeom prst="rect">
             <a:avLst/>
@@ -1732,7 +1730,7 @@
         <p:spPr>
           <a:xfrm>
             <a:off x="63360" y="5580000"/>
-            <a:ext cx="11996280" cy="899640"/>
+            <a:ext cx="11995920" cy="899280"/>
           </a:xfrm>
           <a:prstGeom prst="rect">
             <a:avLst/>
@@ -1770,7 +1768,7 @@
         <p:spPr>
           <a:xfrm>
             <a:off x="1260000" y="3419640"/>
-            <a:ext cx="10799640" cy="1437120"/>
+            <a:ext cx="10799280" cy="1436760"/>
           </a:xfrm>
           <a:prstGeom prst="rect">
             <a:avLst/>
@@ -1808,7 +1806,7 @@
         <p:spPr>
           <a:xfrm>
             <a:off x="63360" y="1800000"/>
-            <a:ext cx="1195920" cy="1619280"/>
+            <a:ext cx="1195560" cy="1618920"/>
           </a:xfrm>
           <a:prstGeom prst="rect">
             <a:avLst/>
@@ -1846,7 +1844,7 @@
         <p:spPr>
           <a:xfrm>
             <a:off x="63360" y="3419640"/>
-            <a:ext cx="1196280" cy="1440000"/>
+            <a:ext cx="1195920" cy="1439640"/>
           </a:xfrm>
           <a:prstGeom prst="rect">
             <a:avLst/>
@@ -1884,7 +1882,7 @@
         <p:spPr>
           <a:xfrm>
             <a:off x="63360" y="4860000"/>
-            <a:ext cx="1180080" cy="617760"/>
+            <a:ext cx="1179720" cy="617400"/>
           </a:xfrm>
           <a:prstGeom prst="rect">
             <a:avLst/>
@@ -1922,7 +1920,7 @@
         <p:spPr>
           <a:xfrm>
             <a:off x="63360" y="5580000"/>
-            <a:ext cx="1180080" cy="1079640"/>
+            <a:ext cx="1179720" cy="1079280"/>
           </a:xfrm>
           <a:prstGeom prst="rect">
             <a:avLst/>
@@ -2125,7 +2123,7 @@
         <p:spPr>
           <a:xfrm>
             <a:off x="1440000" y="1800000"/>
-            <a:ext cx="1939320" cy="899640"/>
+            <a:ext cx="1938960" cy="899280"/>
           </a:xfrm>
           <a:prstGeom prst="roundRect">
             <a:avLst>
@@ -2188,7 +2186,7 @@
         <p:spPr>
           <a:xfrm>
             <a:off x="3304440" y="2520000"/>
-            <a:ext cx="2151720" cy="334440"/>
+            <a:ext cx="2151360" cy="334080"/>
           </a:xfrm>
           <a:prstGeom prst="roundRect">
             <a:avLst>
@@ -2253,7 +2251,7 @@
         <p:spPr>
           <a:xfrm>
             <a:off x="1431360" y="5681880"/>
-            <a:ext cx="1808280" cy="437760"/>
+            <a:ext cx="1807920" cy="437400"/>
           </a:xfrm>
           <a:prstGeom prst="roundRect">
             <a:avLst>
@@ -2316,7 +2314,7 @@
         <p:spPr>
           <a:xfrm>
             <a:off x="1980000" y="4320000"/>
-            <a:ext cx="1619640" cy="179640"/>
+            <a:ext cx="1619280" cy="179280"/>
           </a:xfrm>
           <a:prstGeom prst="roundRect">
             <a:avLst>
@@ -2379,7 +2377,7 @@
         <p:spPr>
           <a:xfrm>
             <a:off x="1260000" y="1260000"/>
-            <a:ext cx="8099640" cy="454320"/>
+            <a:ext cx="8099280" cy="453960"/>
           </a:xfrm>
           <a:prstGeom prst="roundRect">
             <a:avLst>
@@ -2419,7 +2417,7 @@
         <p:spPr>
           <a:xfrm>
             <a:off x="1468440" y="5040000"/>
-            <a:ext cx="151200" cy="176760"/>
+            <a:ext cx="150840" cy="176400"/>
           </a:xfrm>
           <a:prstGeom prst="parallelogram">
             <a:avLst>
@@ -2457,7 +2455,7 @@
         <p:spPr>
           <a:xfrm>
             <a:off x="63360" y="2377080"/>
-            <a:ext cx="1180080" cy="489960"/>
+            <a:ext cx="1179720" cy="489600"/>
           </a:xfrm>
           <a:prstGeom prst="rect">
             <a:avLst/>
@@ -2511,7 +2509,7 @@
         <p:spPr>
           <a:xfrm>
             <a:off x="63360" y="3631320"/>
-            <a:ext cx="1180080" cy="244440"/>
+            <a:ext cx="1179720" cy="244080"/>
           </a:xfrm>
           <a:prstGeom prst="rect">
             <a:avLst/>
@@ -2565,7 +2563,7 @@
         <p:spPr>
           <a:xfrm>
             <a:off x="0" y="4860000"/>
-            <a:ext cx="1180080" cy="489960"/>
+            <a:ext cx="1179720" cy="489600"/>
           </a:xfrm>
           <a:prstGeom prst="rect">
             <a:avLst/>
@@ -2619,7 +2617,7 @@
         <p:spPr>
           <a:xfrm>
             <a:off x="63360" y="5307480"/>
-            <a:ext cx="1180080" cy="489960"/>
+            <a:ext cx="1179720" cy="489600"/>
           </a:xfrm>
           <a:prstGeom prst="rect">
             <a:avLst/>
@@ -2645,7 +2643,7 @@
         <p:spPr>
           <a:xfrm>
             <a:off x="1433520" y="1397880"/>
-            <a:ext cx="407520" cy="253080"/>
+            <a:ext cx="407160" cy="252720"/>
           </a:xfrm>
           <a:prstGeom prst="rect">
             <a:avLst/>
@@ -2699,7 +2697,7 @@
         <p:spPr>
           <a:xfrm>
             <a:off x="3443400" y="1397880"/>
-            <a:ext cx="516240" cy="253080"/>
+            <a:ext cx="515880" cy="252720"/>
           </a:xfrm>
           <a:prstGeom prst="rect">
             <a:avLst/>
@@ -2753,7 +2751,7 @@
         <p:spPr>
           <a:xfrm>
             <a:off x="5520240" y="1397880"/>
-            <a:ext cx="551160" cy="253080"/>
+            <a:ext cx="550800" cy="252720"/>
           </a:xfrm>
           <a:prstGeom prst="rect">
             <a:avLst/>
@@ -2807,7 +2805,7 @@
         <p:spPr>
           <a:xfrm>
             <a:off x="7597080" y="1397880"/>
-            <a:ext cx="861840" cy="253080"/>
+            <a:ext cx="861480" cy="252720"/>
           </a:xfrm>
           <a:prstGeom prst="rect">
             <a:avLst/>
@@ -2861,7 +2859,7 @@
         <p:spPr>
           <a:xfrm>
             <a:off x="8569440" y="2379240"/>
-            <a:ext cx="964080" cy="167400"/>
+            <a:ext cx="963720" cy="167040"/>
           </a:xfrm>
           <a:prstGeom prst="rect">
             <a:avLst/>
@@ -2887,7 +2885,7 @@
         <p:spPr>
           <a:xfrm>
             <a:off x="1800000" y="5051880"/>
-            <a:ext cx="1439640" cy="167760"/>
+            <a:ext cx="1439280" cy="167400"/>
           </a:xfrm>
           <a:prstGeom prst="rect">
             <a:avLst/>
@@ -2941,7 +2939,7 @@
         <p:spPr>
           <a:xfrm>
             <a:off x="10847160" y="6295320"/>
-            <a:ext cx="570600" cy="167400"/>
+            <a:ext cx="570240" cy="167040"/>
           </a:xfrm>
           <a:prstGeom prst="rect">
             <a:avLst/>
@@ -2967,7 +2965,7 @@
         <p:spPr>
           <a:xfrm>
             <a:off x="9000360" y="5992200"/>
-            <a:ext cx="608400" cy="167400"/>
+            <a:ext cx="608040" cy="167040"/>
           </a:xfrm>
           <a:prstGeom prst="rect">
             <a:avLst/>
@@ -2993,7 +2991,7 @@
         <p:spPr>
           <a:xfrm>
             <a:off x="6136200" y="2696760"/>
-            <a:ext cx="1307160" cy="167400"/>
+            <a:ext cx="1306800" cy="167040"/>
           </a:xfrm>
           <a:prstGeom prst="rect">
             <a:avLst/>
@@ -3019,7 +3017,7 @@
         <p:spPr>
           <a:xfrm>
             <a:off x="7643520" y="4912920"/>
-            <a:ext cx="570600" cy="203400"/>
+            <a:ext cx="570240" cy="203040"/>
           </a:xfrm>
           <a:prstGeom prst="rect">
             <a:avLst/>
@@ -3073,7 +3071,7 @@
         <p:spPr>
           <a:xfrm>
             <a:off x="9300960" y="5595120"/>
-            <a:ext cx="570600" cy="203400"/>
+            <a:ext cx="570240" cy="203040"/>
           </a:xfrm>
           <a:prstGeom prst="rect">
             <a:avLst/>
@@ -3127,7 +3125,7 @@
         <p:spPr>
           <a:xfrm>
             <a:off x="7296120" y="5999760"/>
-            <a:ext cx="938880" cy="152280"/>
+            <a:ext cx="938520" cy="151920"/>
           </a:xfrm>
           <a:prstGeom prst="rect">
             <a:avLst/>
@@ -3181,7 +3179,7 @@
         <p:spPr>
           <a:xfrm>
             <a:off x="6644520" y="3076200"/>
-            <a:ext cx="1116360" cy="167400"/>
+            <a:ext cx="1116000" cy="167040"/>
           </a:xfrm>
           <a:prstGeom prst="rect">
             <a:avLst/>
@@ -3347,7 +3345,7 @@
         <p:spPr>
           <a:xfrm>
             <a:off x="3960000" y="360000"/>
-            <a:ext cx="5039640" cy="699480"/>
+            <a:ext cx="5039280" cy="699120"/>
           </a:xfrm>
           <a:prstGeom prst="rect">
             <a:avLst/>
@@ -3398,7 +3396,7 @@
         <p:spPr>
           <a:xfrm>
             <a:off x="5464440" y="2912760"/>
-            <a:ext cx="2068560" cy="343080"/>
+            <a:ext cx="2068200" cy="342720"/>
           </a:xfrm>
           <a:prstGeom prst="roundRect">
             <a:avLst>
@@ -3461,7 +3459,7 @@
         <p:spPr>
           <a:xfrm>
             <a:off x="1980000" y="3960000"/>
-            <a:ext cx="1399320" cy="359640"/>
+            <a:ext cx="1398960" cy="359280"/>
           </a:xfrm>
           <a:prstGeom prst="roundRect">
             <a:avLst>
@@ -3524,7 +3522,7 @@
         <p:spPr>
           <a:xfrm>
             <a:off x="1440000" y="3420000"/>
-            <a:ext cx="1259640" cy="539640"/>
+            <a:ext cx="1259280" cy="539280"/>
           </a:xfrm>
           <a:prstGeom prst="roundRect">
             <a:avLst>
@@ -3587,7 +3585,7 @@
         <p:spPr>
           <a:xfrm>
             <a:off x="3420000" y="3960000"/>
-            <a:ext cx="1619640" cy="359640"/>
+            <a:ext cx="1619280" cy="359280"/>
           </a:xfrm>
           <a:prstGeom prst="roundRect">
             <a:avLst>
@@ -3650,7 +3648,7 @@
         <p:spPr>
           <a:xfrm>
             <a:off x="3240000" y="3420000"/>
-            <a:ext cx="1079640" cy="539640"/>
+            <a:ext cx="1079280" cy="539280"/>
           </a:xfrm>
           <a:prstGeom prst="roundRect">
             <a:avLst>
@@ -3713,7 +3711,7 @@
         <p:spPr>
           <a:xfrm>
             <a:off x="4385160" y="3600000"/>
-            <a:ext cx="1194480" cy="359640"/>
+            <a:ext cx="1194120" cy="359280"/>
           </a:xfrm>
           <a:prstGeom prst="roundRect">
             <a:avLst>
@@ -3776,7 +3774,7 @@
         <p:spPr>
           <a:xfrm>
             <a:off x="3647880" y="5760000"/>
-            <a:ext cx="3371760" cy="359640"/>
+            <a:ext cx="3371400" cy="359280"/>
           </a:xfrm>
           <a:prstGeom prst="roundRect">
             <a:avLst>
@@ -3839,7 +3837,7 @@
         <p:spPr>
           <a:xfrm>
             <a:off x="5580000" y="3600000"/>
-            <a:ext cx="1439640" cy="359640"/>
+            <a:ext cx="1439280" cy="359280"/>
           </a:xfrm>
           <a:prstGeom prst="roundRect">
             <a:avLst>
@@ -3902,7 +3900,7 @@
         <p:spPr>
           <a:xfrm>
             <a:off x="3600000" y="4500000"/>
-            <a:ext cx="1194480" cy="179640"/>
+            <a:ext cx="1194120" cy="179280"/>
           </a:xfrm>
           <a:prstGeom prst="roundRect">
             <a:avLst>
@@ -3965,7 +3963,7 @@
         <p:spPr>
           <a:xfrm>
             <a:off x="3960000" y="6120000"/>
-            <a:ext cx="3059640" cy="359640"/>
+            <a:ext cx="3059280" cy="359280"/>
           </a:xfrm>
           <a:prstGeom prst="roundRect">
             <a:avLst>
@@ -4028,7 +4026,7 @@
         <p:spPr>
           <a:xfrm>
             <a:off x="4860000" y="4500000"/>
-            <a:ext cx="2339640" cy="179640"/>
+            <a:ext cx="2339280" cy="179280"/>
           </a:xfrm>
           <a:prstGeom prst="roundRect">
             <a:avLst>
@@ -4091,7 +4089,7 @@
         <p:spPr>
           <a:xfrm>
             <a:off x="5580000" y="3976560"/>
-            <a:ext cx="1375200" cy="343080"/>
+            <a:ext cx="1374840" cy="342720"/>
           </a:xfrm>
           <a:prstGeom prst="roundRect">
             <a:avLst>
@@ -4154,7 +4152,7 @@
         <p:spPr>
           <a:xfrm>
             <a:off x="3420000" y="2160000"/>
-            <a:ext cx="179640" cy="179640"/>
+            <a:ext cx="179280" cy="179280"/>
           </a:xfrm>
           <a:custGeom>
             <a:avLst/>
@@ -4207,7 +4205,7 @@
         <p:spPr>
           <a:xfrm>
             <a:off x="5636520" y="2591280"/>
-            <a:ext cx="719640" cy="272880"/>
+            <a:ext cx="719280" cy="272520"/>
           </a:xfrm>
           <a:prstGeom prst="rect">
             <a:avLst/>
@@ -4235,7 +4233,11 @@
             </a:pPr>
             <a:r>
               <a:rPr b="0" lang="fr-FR" sz="900" spc="-1" strike="noStrike">
+                <a:solidFill>
+                  <a:srgbClr val="000000"/>
+                </a:solidFill>
                 <a:latin typeface="MV Boli"/>
+                <a:ea typeface="DejaVu Sans"/>
               </a:rPr>
               <a:t>Recette</a:t>
             </a:r>
@@ -4254,7 +4256,7 @@
         <p:spPr>
           <a:xfrm>
             <a:off x="3600000" y="2160000"/>
-            <a:ext cx="719640" cy="272880"/>
+            <a:ext cx="719280" cy="272520"/>
           </a:xfrm>
           <a:prstGeom prst="rect">
             <a:avLst/>
@@ -4282,7 +4284,11 @@
             </a:pPr>
             <a:r>
               <a:rPr b="0" lang="fr-FR" sz="900" spc="-1" strike="noStrike">
+                <a:solidFill>
+                  <a:srgbClr val="000000"/>
+                </a:solidFill>
                 <a:latin typeface="MV Boli"/>
+                <a:ea typeface="DejaVu Sans"/>
               </a:rPr>
               <a:t>Recette</a:t>
             </a:r>
@@ -4301,7 +4307,7 @@
         <p:spPr>
           <a:xfrm>
             <a:off x="7740000" y="2912760"/>
-            <a:ext cx="719640" cy="272880"/>
+            <a:ext cx="719280" cy="272520"/>
           </a:xfrm>
           <a:prstGeom prst="rect">
             <a:avLst/>
@@ -4329,7 +4335,11 @@
             </a:pPr>
             <a:r>
               <a:rPr b="0" lang="fr-FR" sz="900" spc="-1" strike="noStrike">
+                <a:solidFill>
+                  <a:srgbClr val="000000"/>
+                </a:solidFill>
                 <a:latin typeface="MV Boli"/>
+                <a:ea typeface="DejaVu Sans"/>
               </a:rPr>
               <a:t>Recette</a:t>
             </a:r>
@@ -4348,7 +4358,7 @@
         <p:spPr>
           <a:xfrm>
             <a:off x="5456520" y="2613240"/>
-            <a:ext cx="179640" cy="179640"/>
+            <a:ext cx="179280" cy="179280"/>
           </a:xfrm>
           <a:custGeom>
             <a:avLst/>
@@ -4401,7 +4411,7 @@
         <p:spPr>
           <a:xfrm>
             <a:off x="7581240" y="2912760"/>
-            <a:ext cx="179640" cy="179640"/>
+            <a:ext cx="179280" cy="179280"/>
           </a:xfrm>
           <a:custGeom>
             <a:avLst/>
@@ -4454,7 +4464,7 @@
         <p:spPr>
           <a:xfrm>
             <a:off x="3780000" y="1980000"/>
-            <a:ext cx="179640" cy="179640"/>
+            <a:ext cx="179280" cy="179280"/>
           </a:xfrm>
           <a:prstGeom prst="verticalScroll">
             <a:avLst>
@@ -4486,7 +4496,7 @@
         <p:spPr>
           <a:xfrm>
             <a:off x="3960000" y="1980000"/>
-            <a:ext cx="719640" cy="272880"/>
+            <a:ext cx="719280" cy="272520"/>
           </a:xfrm>
           <a:prstGeom prst="rect">
             <a:avLst/>
@@ -4514,7 +4524,11 @@
             </a:pPr>
             <a:r>
               <a:rPr b="0" lang="fr-FR" sz="900" spc="-1" strike="noStrike">
+                <a:solidFill>
+                  <a:srgbClr val="000000"/>
+                </a:solidFill>
                 <a:latin typeface="MV Boli"/>
+                <a:ea typeface="DejaVu Sans"/>
               </a:rPr>
               <a:t>Livrables</a:t>
             </a:r>
@@ -4533,7 +4547,7 @@
         <p:spPr>
           <a:xfrm>
             <a:off x="5580000" y="2340000"/>
-            <a:ext cx="179640" cy="179640"/>
+            <a:ext cx="179280" cy="179280"/>
           </a:xfrm>
           <a:prstGeom prst="verticalScroll">
             <a:avLst>
@@ -4565,7 +4579,7 @@
         <p:spPr>
           <a:xfrm>
             <a:off x="7740000" y="2700000"/>
-            <a:ext cx="179640" cy="179640"/>
+            <a:ext cx="179280" cy="179280"/>
           </a:xfrm>
           <a:prstGeom prst="verticalScroll">
             <a:avLst>
@@ -4597,7 +4611,7 @@
         <p:spPr>
           <a:xfrm>
             <a:off x="5760000" y="2318040"/>
-            <a:ext cx="719640" cy="272880"/>
+            <a:ext cx="719280" cy="272520"/>
           </a:xfrm>
           <a:prstGeom prst="rect">
             <a:avLst/>
@@ -4625,7 +4639,11 @@
             </a:pPr>
             <a:r>
               <a:rPr b="0" lang="fr-FR" sz="900" spc="-1" strike="noStrike">
+                <a:solidFill>
+                  <a:srgbClr val="000000"/>
+                </a:solidFill>
                 <a:latin typeface="MV Boli"/>
+                <a:ea typeface="DejaVu Sans"/>
               </a:rPr>
               <a:t>Livrables</a:t>
             </a:r>
@@ -4644,7 +4662,7 @@
         <p:spPr>
           <a:xfrm>
             <a:off x="7920000" y="2639520"/>
-            <a:ext cx="719640" cy="272880"/>
+            <a:ext cx="719280" cy="272520"/>
           </a:xfrm>
           <a:prstGeom prst="rect">
             <a:avLst/>
@@ -4672,7 +4690,11 @@
             </a:pPr>
             <a:r>
               <a:rPr b="0" lang="fr-FR" sz="900" spc="-1" strike="noStrike">
+                <a:solidFill>
+                  <a:srgbClr val="000000"/>
+                </a:solidFill>
                 <a:latin typeface="MV Boli"/>
+                <a:ea typeface="DejaVu Sans"/>
               </a:rPr>
               <a:t>Livrables</a:t>
             </a:r>
@@ -4691,7 +4713,7 @@
         <p:spPr>
           <a:xfrm>
             <a:off x="7020000" y="4140000"/>
-            <a:ext cx="1195200" cy="179640"/>
+            <a:ext cx="1194840" cy="179280"/>
           </a:xfrm>
           <a:prstGeom prst="roundRect">
             <a:avLst>
@@ -4753,8 +4775,8 @@
         </p:nvSpPr>
         <p:spPr>
           <a:xfrm rot="29400">
-            <a:off x="8278560" y="4135680"/>
-            <a:ext cx="899640" cy="179640"/>
+            <a:off x="8278200" y="4135320"/>
+            <a:ext cx="899280" cy="179280"/>
           </a:xfrm>
           <a:prstGeom prst="roundRect">
             <a:avLst>
@@ -4817,7 +4839,7 @@
         <p:spPr>
           <a:xfrm>
             <a:off x="7533360" y="5792400"/>
-            <a:ext cx="3012480" cy="359640"/>
+            <a:ext cx="3012120" cy="359280"/>
           </a:xfrm>
           <a:prstGeom prst="roundRect">
             <a:avLst>
@@ -4880,7 +4902,7 @@
         <p:spPr>
           <a:xfrm>
             <a:off x="1431360" y="6152400"/>
-            <a:ext cx="2168280" cy="507240"/>
+            <a:ext cx="2167920" cy="506880"/>
           </a:xfrm>
           <a:prstGeom prst="roundRect">
             <a:avLst>
@@ -4943,7 +4965,7 @@
         <p:spPr>
           <a:xfrm>
             <a:off x="1620360" y="5040000"/>
-            <a:ext cx="151200" cy="176760"/>
+            <a:ext cx="150840" cy="176400"/>
           </a:xfrm>
           <a:prstGeom prst="parallelogram">
             <a:avLst>
@@ -4981,7 +5003,7 @@
         <p:spPr>
           <a:xfrm>
             <a:off x="1316880" y="5042880"/>
-            <a:ext cx="151200" cy="176760"/>
+            <a:ext cx="150840" cy="176400"/>
           </a:xfrm>
           <a:prstGeom prst="parallelogram">
             <a:avLst>
@@ -5019,7 +5041,7 @@
         <p:spPr>
           <a:xfrm>
             <a:off x="3780000" y="5040000"/>
-            <a:ext cx="179640" cy="179640"/>
+            <a:ext cx="179280" cy="179280"/>
           </a:xfrm>
           <a:prstGeom prst="verticalScroll">
             <a:avLst>
@@ -5051,7 +5073,7 @@
         <p:spPr>
           <a:xfrm>
             <a:off x="3960000" y="5040000"/>
-            <a:ext cx="1079640" cy="167760"/>
+            <a:ext cx="1079280" cy="167400"/>
           </a:xfrm>
           <a:prstGeom prst="rect">
             <a:avLst/>
@@ -5105,7 +5127,7 @@
         <p:spPr>
           <a:xfrm>
             <a:off x="5400000" y="5040000"/>
-            <a:ext cx="179640" cy="179640"/>
+            <a:ext cx="179280" cy="179280"/>
           </a:xfrm>
           <a:custGeom>
             <a:avLst/>
@@ -5158,7 +5180,7 @@
         <p:spPr>
           <a:xfrm>
             <a:off x="5580000" y="5051880"/>
-            <a:ext cx="1079640" cy="167760"/>
+            <a:ext cx="1079280" cy="167400"/>
           </a:xfrm>
           <a:prstGeom prst="rect">
             <a:avLst/>
@@ -5212,7 +5234,7 @@
         <p:spPr>
           <a:xfrm>
             <a:off x="4140000" y="1800000"/>
-            <a:ext cx="179640" cy="179640"/>
+            <a:ext cx="179280" cy="179280"/>
           </a:xfrm>
           <a:custGeom>
             <a:avLst/>
@@ -5283,7 +5305,7 @@
         <p:spPr>
           <a:xfrm>
             <a:off x="5940000" y="2138040"/>
-            <a:ext cx="179640" cy="179640"/>
+            <a:ext cx="179280" cy="179280"/>
           </a:xfrm>
           <a:custGeom>
             <a:avLst/>
@@ -5354,7 +5376,7 @@
         <p:spPr>
           <a:xfrm>
             <a:off x="7920000" y="2459520"/>
-            <a:ext cx="179640" cy="179640"/>
+            <a:ext cx="179280" cy="179280"/>
           </a:xfrm>
           <a:custGeom>
             <a:avLst/>
@@ -5425,7 +5447,7 @@
         <p:spPr>
           <a:xfrm>
             <a:off x="4320000" y="1800000"/>
-            <a:ext cx="1079640" cy="272880"/>
+            <a:ext cx="1079280" cy="272520"/>
           </a:xfrm>
           <a:prstGeom prst="rect">
             <a:avLst/>
@@ -5453,7 +5475,11 @@
             </a:pPr>
             <a:r>
               <a:rPr b="0" lang="fr-FR" sz="900" spc="-1" strike="noStrike">
+                <a:solidFill>
+                  <a:srgbClr val="000000"/>
+                </a:solidFill>
                 <a:latin typeface="MV Boli"/>
+                <a:ea typeface="DejaVu Sans"/>
               </a:rPr>
               <a:t>Déploiement</a:t>
             </a:r>
@@ -5472,7 +5498,7 @@
         <p:spPr>
           <a:xfrm>
             <a:off x="7020000" y="5040000"/>
-            <a:ext cx="179640" cy="179640"/>
+            <a:ext cx="179280" cy="179280"/>
           </a:xfrm>
           <a:custGeom>
             <a:avLst/>
@@ -5543,7 +5569,7 @@
         <p:spPr>
           <a:xfrm>
             <a:off x="7134480" y="5040000"/>
-            <a:ext cx="1685160" cy="272880"/>
+            <a:ext cx="1684800" cy="272520"/>
           </a:xfrm>
           <a:prstGeom prst="rect">
             <a:avLst/>
@@ -5571,7 +5597,11 @@
             </a:pPr>
             <a:r>
               <a:rPr b="0" lang="fr-FR" sz="900" spc="-1" strike="noStrike">
+                <a:solidFill>
+                  <a:srgbClr val="000000"/>
+                </a:solidFill>
                 <a:latin typeface="MV Boli"/>
+                <a:ea typeface="DejaVu Sans"/>
               </a:rPr>
               <a:t>Ingenieur systeme</a:t>
             </a:r>
@@ -5590,7 +5620,7 @@
         <p:spPr>
           <a:xfrm>
             <a:off x="6120000" y="2138040"/>
-            <a:ext cx="1079640" cy="272880"/>
+            <a:ext cx="1079280" cy="272520"/>
           </a:xfrm>
           <a:prstGeom prst="rect">
             <a:avLst/>
@@ -5618,7 +5648,11 @@
             </a:pPr>
             <a:r>
               <a:rPr b="0" lang="fr-FR" sz="900" spc="-1" strike="noStrike">
+                <a:solidFill>
+                  <a:srgbClr val="000000"/>
+                </a:solidFill>
                 <a:latin typeface="MV Boli"/>
+                <a:ea typeface="DejaVu Sans"/>
               </a:rPr>
               <a:t>Déploiement</a:t>
             </a:r>
@@ -5637,7 +5671,7 @@
         <p:spPr>
           <a:xfrm>
             <a:off x="8100000" y="2426760"/>
-            <a:ext cx="1079640" cy="272880"/>
+            <a:ext cx="1079280" cy="272520"/>
           </a:xfrm>
           <a:prstGeom prst="rect">
             <a:avLst/>
@@ -5665,2459 +5699,19 @@
             </a:pPr>
             <a:r>
               <a:rPr b="0" lang="fr-FR" sz="900" spc="-1" strike="noStrike">
-                <a:latin typeface="MV Boli"/>
-              </a:rPr>
-              <a:t>Déploiement</a:t>
-            </a:r>
-            <a:endParaRPr b="0" lang="fr-FR" sz="900" spc="-1" strike="noStrike">
-              <a:latin typeface="Arial"/>
-            </a:endParaRPr>
-          </a:p>
-        </p:txBody>
-      </p:sp>
-    </p:spTree>
-  </p:cSld>
-  <mc:AlternateContent>
-    <mc:Choice Requires="p14">
-      <p:transition spd="slow" p14:dur="2000"/>
-    </mc:Choice>
-    <mc:Fallback>
-      <p:transition spd="slow"/>
-    </mc:Fallback>
-  </mc:AlternateContent>
-</p:sld>
-</file>
-
-<file path=ppt/slides/slide2.xml><?xml version="1.0" encoding="utf-8"?>
-<p:sld xmlns:a="http://schemas.openxmlformats.org/drawingml/2006/main" xmlns:p="http://schemas.openxmlformats.org/presentationml/2006/main" xmlns:r="http://schemas.openxmlformats.org/officeDocument/2006/relationships" xmlns:p14="http://schemas.microsoft.com/office/powerpoint/2010/main" xmlns:p15="http://schemas.microsoft.com/office/powerpoint/2012/main" xmlns:mc="http://schemas.openxmlformats.org/markup-compatibility/2006">
-  <p:cSld>
-    <p:spTree>
-      <p:nvGrpSpPr>
-        <p:cNvPr id="1" name=""/>
-        <p:cNvGrpSpPr/>
-        <p:nvPr/>
-      </p:nvGrpSpPr>
-      <p:grpSpPr>
-        <a:xfrm>
-          <a:off x="0" y="0"/>
-          <a:ext cx="0" cy="0"/>
-          <a:chOff x="0" y="0"/>
-          <a:chExt cx="0" cy="0"/>
-        </a:xfrm>
-      </p:grpSpPr>
-      <p:sp>
-        <p:nvSpPr>
-          <p:cNvPr id="120" name="CustomShape 1"/>
-          <p:cNvSpPr/>
-          <p:nvPr/>
-        </p:nvSpPr>
-        <p:spPr>
-          <a:xfrm>
-            <a:off x="1259640" y="1800000"/>
-            <a:ext cx="10800000" cy="1619280"/>
-          </a:xfrm>
-          <a:prstGeom prst="rect">
-            <a:avLst/>
-          </a:prstGeom>
-          <a:solidFill>
-            <a:schemeClr val="accent6">
-              <a:alpha val="15000"/>
-            </a:schemeClr>
-          </a:solidFill>
-          <a:ln w="19050">
-            <a:noFill/>
-          </a:ln>
-        </p:spPr>
-        <p:style>
-          <a:lnRef idx="2">
-            <a:schemeClr val="accent1">
-              <a:shade val="50000"/>
-            </a:schemeClr>
-          </a:lnRef>
-          <a:fillRef idx="1">
-            <a:schemeClr val="accent1"/>
-          </a:fillRef>
-          <a:effectRef idx="0">
-            <a:schemeClr val="accent1"/>
-          </a:effectRef>
-          <a:fontRef idx="minor"/>
-        </p:style>
-      </p:sp>
-      <p:sp>
-        <p:nvSpPr>
-          <p:cNvPr id="121" name="CustomShape 2"/>
-          <p:cNvSpPr/>
-          <p:nvPr/>
-        </p:nvSpPr>
-        <p:spPr>
-          <a:xfrm>
-            <a:off x="63360" y="5580000"/>
-            <a:ext cx="11556000" cy="899640"/>
-          </a:xfrm>
-          <a:prstGeom prst="rect">
-            <a:avLst/>
-          </a:prstGeom>
-          <a:solidFill>
-            <a:schemeClr val="accent2">
-              <a:alpha val="15000"/>
-            </a:schemeClr>
-          </a:solidFill>
-          <a:ln w="12700">
-            <a:noFill/>
-          </a:ln>
-        </p:spPr>
-        <p:style>
-          <a:lnRef idx="2">
-            <a:schemeClr val="accent1">
-              <a:shade val="50000"/>
-            </a:schemeClr>
-          </a:lnRef>
-          <a:fillRef idx="1">
-            <a:schemeClr val="accent1"/>
-          </a:fillRef>
-          <a:effectRef idx="0">
-            <a:schemeClr val="accent1"/>
-          </a:effectRef>
-          <a:fontRef idx="minor"/>
-        </p:style>
-      </p:sp>
-      <p:sp>
-        <p:nvSpPr>
-          <p:cNvPr id="122" name="CustomShape 3"/>
-          <p:cNvSpPr/>
-          <p:nvPr/>
-        </p:nvSpPr>
-        <p:spPr>
-          <a:xfrm>
-            <a:off x="1260000" y="3419640"/>
-            <a:ext cx="10799640" cy="1437120"/>
-          </a:xfrm>
-          <a:prstGeom prst="rect">
-            <a:avLst/>
-          </a:prstGeom>
-          <a:solidFill>
-            <a:schemeClr val="accent4">
-              <a:alpha val="15000"/>
-            </a:schemeClr>
-          </a:solidFill>
-          <a:ln w="12700">
-            <a:noFill/>
-          </a:ln>
-        </p:spPr>
-        <p:style>
-          <a:lnRef idx="2">
-            <a:schemeClr val="accent1">
-              <a:shade val="50000"/>
-            </a:schemeClr>
-          </a:lnRef>
-          <a:fillRef idx="1">
-            <a:schemeClr val="accent1"/>
-          </a:fillRef>
-          <a:effectRef idx="0">
-            <a:schemeClr val="accent1"/>
-          </a:effectRef>
-          <a:fontRef idx="minor"/>
-        </p:style>
-      </p:sp>
-      <p:sp>
-        <p:nvSpPr>
-          <p:cNvPr id="123" name="CustomShape 4"/>
-          <p:cNvSpPr/>
-          <p:nvPr/>
-        </p:nvSpPr>
-        <p:spPr>
-          <a:xfrm>
-            <a:off x="63360" y="1800000"/>
-            <a:ext cx="1195920" cy="1619280"/>
-          </a:xfrm>
-          <a:prstGeom prst="rect">
-            <a:avLst/>
-          </a:prstGeom>
-          <a:solidFill>
-            <a:schemeClr val="accent3">
-              <a:alpha val="50000"/>
-            </a:schemeClr>
-          </a:solidFill>
-          <a:ln w="12700">
-            <a:noFill/>
-          </a:ln>
-        </p:spPr>
-        <p:style>
-          <a:lnRef idx="2">
-            <a:schemeClr val="accent1">
-              <a:shade val="50000"/>
-            </a:schemeClr>
-          </a:lnRef>
-          <a:fillRef idx="1">
-            <a:schemeClr val="accent1"/>
-          </a:fillRef>
-          <a:effectRef idx="0">
-            <a:schemeClr val="accent1"/>
-          </a:effectRef>
-          <a:fontRef idx="minor"/>
-        </p:style>
-      </p:sp>
-      <p:sp>
-        <p:nvSpPr>
-          <p:cNvPr id="124" name="CustomShape 5"/>
-          <p:cNvSpPr/>
-          <p:nvPr/>
-        </p:nvSpPr>
-        <p:spPr>
-          <a:xfrm>
-            <a:off x="63360" y="3419640"/>
-            <a:ext cx="1196280" cy="1440000"/>
-          </a:xfrm>
-          <a:prstGeom prst="rect">
-            <a:avLst/>
-          </a:prstGeom>
-          <a:solidFill>
-            <a:schemeClr val="accent4">
-              <a:alpha val="50000"/>
-            </a:schemeClr>
-          </a:solidFill>
-          <a:ln w="12700">
-            <a:noFill/>
-          </a:ln>
-        </p:spPr>
-        <p:style>
-          <a:lnRef idx="2">
-            <a:schemeClr val="accent1">
-              <a:shade val="50000"/>
-            </a:schemeClr>
-          </a:lnRef>
-          <a:fillRef idx="1">
-            <a:schemeClr val="accent1"/>
-          </a:fillRef>
-          <a:effectRef idx="0">
-            <a:schemeClr val="accent1"/>
-          </a:effectRef>
-          <a:fontRef idx="minor"/>
-        </p:style>
-      </p:sp>
-      <p:sp>
-        <p:nvSpPr>
-          <p:cNvPr id="125" name="CustomShape 6"/>
-          <p:cNvSpPr/>
-          <p:nvPr/>
-        </p:nvSpPr>
-        <p:spPr>
-          <a:xfrm>
-            <a:off x="63360" y="5580000"/>
-            <a:ext cx="1180080" cy="899640"/>
-          </a:xfrm>
-          <a:prstGeom prst="rect">
-            <a:avLst/>
-          </a:prstGeom>
-          <a:solidFill>
-            <a:srgbClr val="618197">
-              <a:alpha val="50000"/>
-            </a:srgbClr>
-          </a:solidFill>
-          <a:ln w="12700">
-            <a:noFill/>
-          </a:ln>
-        </p:spPr>
-        <p:style>
-          <a:lnRef idx="2">
-            <a:schemeClr val="accent1">
-              <a:shade val="50000"/>
-            </a:schemeClr>
-          </a:lnRef>
-          <a:fillRef idx="1">
-            <a:schemeClr val="accent1"/>
-          </a:fillRef>
-          <a:effectRef idx="0">
-            <a:schemeClr val="accent1"/>
-          </a:effectRef>
-          <a:fontRef idx="minor"/>
-        </p:style>
-        <p:txBody>
-          <a:bodyPr lIns="90000" rIns="90000" tIns="45000" bIns="45000">
-            <a:noAutofit/>
-          </a:bodyPr>
-          <a:p>
-            <a:pPr algn="ctr">
-              <a:lnSpc>
-                <a:spcPct val="100000"/>
-              </a:lnSpc>
-            </a:pPr>
-            <a:r>
-              <a:rPr b="0" lang="fr-FR" sz="1200" spc="-1" strike="noStrike">
                 <a:solidFill>
                   <a:srgbClr val="000000"/>
                 </a:solidFill>
                 <a:latin typeface="MV Boli"/>
                 <a:ea typeface="DejaVu Sans"/>
               </a:rPr>
-              <a:t>Enjeux</a:t>
+              <a:t>Déploiement</a:t>
             </a:r>
-            <a:endParaRPr b="0" lang="fr-FR" sz="1200" spc="-1" strike="noStrike">
-              <a:latin typeface="Arial"/>
-            </a:endParaRPr>
-          </a:p>
-        </p:txBody>
-      </p:sp>
-      <p:sp>
-        <p:nvSpPr>
-          <p:cNvPr id="126" name="Line 7"/>
-          <p:cNvSpPr/>
-          <p:nvPr/>
-        </p:nvSpPr>
-        <p:spPr>
-          <a:xfrm>
-            <a:off x="3379680" y="2095200"/>
-            <a:ext cx="0" cy="4449600"/>
-          </a:xfrm>
-          <a:prstGeom prst="line">
-            <a:avLst/>
-          </a:prstGeom>
-          <a:ln>
-            <a:solidFill>
-              <a:schemeClr val="accent5">
-                <a:alpha val="14902"/>
-              </a:schemeClr>
-            </a:solidFill>
-          </a:ln>
-        </p:spPr>
-        <p:style>
-          <a:lnRef idx="1">
-            <a:schemeClr val="accent1"/>
-          </a:lnRef>
-          <a:fillRef idx="0">
-            <a:schemeClr val="accent1"/>
-          </a:fillRef>
-          <a:effectRef idx="0">
-            <a:schemeClr val="accent1"/>
-          </a:effectRef>
-          <a:fontRef idx="minor"/>
-        </p:style>
-      </p:sp>
-      <p:sp>
-        <p:nvSpPr>
-          <p:cNvPr id="127" name="Line 8"/>
-          <p:cNvSpPr/>
-          <p:nvPr/>
-        </p:nvSpPr>
-        <p:spPr>
-          <a:xfrm>
-            <a:off x="5456520" y="2095200"/>
-            <a:ext cx="0" cy="4449600"/>
-          </a:xfrm>
-          <a:prstGeom prst="line">
-            <a:avLst/>
-          </a:prstGeom>
-          <a:ln>
-            <a:solidFill>
-              <a:schemeClr val="accent5">
-                <a:alpha val="14902"/>
-              </a:schemeClr>
-            </a:solidFill>
-          </a:ln>
-        </p:spPr>
-        <p:style>
-          <a:lnRef idx="1">
-            <a:schemeClr val="accent1"/>
-          </a:lnRef>
-          <a:fillRef idx="0">
-            <a:schemeClr val="accent1"/>
-          </a:fillRef>
-          <a:effectRef idx="0">
-            <a:schemeClr val="accent1"/>
-          </a:effectRef>
-          <a:fontRef idx="minor"/>
-        </p:style>
-      </p:sp>
-      <p:sp>
-        <p:nvSpPr>
-          <p:cNvPr id="128" name="Line 9"/>
-          <p:cNvSpPr/>
-          <p:nvPr/>
-        </p:nvSpPr>
-        <p:spPr>
-          <a:xfrm>
-            <a:off x="7533360" y="2095200"/>
-            <a:ext cx="0" cy="4449600"/>
-          </a:xfrm>
-          <a:prstGeom prst="line">
-            <a:avLst/>
-          </a:prstGeom>
-          <a:ln>
-            <a:solidFill>
-              <a:schemeClr val="accent5">
-                <a:alpha val="14902"/>
-              </a:schemeClr>
-            </a:solidFill>
-          </a:ln>
-        </p:spPr>
-        <p:style>
-          <a:lnRef idx="1">
-            <a:schemeClr val="accent1"/>
-          </a:lnRef>
-          <a:fillRef idx="0">
-            <a:schemeClr val="accent1"/>
-          </a:fillRef>
-          <a:effectRef idx="0">
-            <a:schemeClr val="accent1"/>
-          </a:effectRef>
-          <a:fontRef idx="minor"/>
-        </p:style>
-      </p:sp>
-      <p:sp>
-        <p:nvSpPr>
-          <p:cNvPr id="129" name="Line 10"/>
-          <p:cNvSpPr/>
-          <p:nvPr/>
-        </p:nvSpPr>
-        <p:spPr>
-          <a:xfrm>
-            <a:off x="9543240" y="2095200"/>
-            <a:ext cx="0" cy="4449600"/>
-          </a:xfrm>
-          <a:prstGeom prst="line">
-            <a:avLst/>
-          </a:prstGeom>
-          <a:ln>
-            <a:solidFill>
-              <a:schemeClr val="accent5">
-                <a:alpha val="14902"/>
-              </a:schemeClr>
-            </a:solidFill>
-          </a:ln>
-        </p:spPr>
-        <p:style>
-          <a:lnRef idx="1">
-            <a:schemeClr val="accent1"/>
-          </a:lnRef>
-          <a:fillRef idx="0">
-            <a:schemeClr val="accent1"/>
-          </a:fillRef>
-          <a:effectRef idx="0">
-            <a:schemeClr val="accent1"/>
-          </a:effectRef>
-          <a:fontRef idx="minor"/>
-        </p:style>
-      </p:sp>
-      <p:sp>
-        <p:nvSpPr>
-          <p:cNvPr id="130" name="CustomShape 11"/>
-          <p:cNvSpPr/>
-          <p:nvPr/>
-        </p:nvSpPr>
-        <p:spPr>
-          <a:xfrm>
-            <a:off x="3304440" y="2520000"/>
-            <a:ext cx="2151720" cy="334440"/>
-          </a:xfrm>
-          <a:prstGeom prst="roundRect">
-            <a:avLst>
-              <a:gd name="adj" fmla="val 100000"/>
-            </a:avLst>
-          </a:prstGeom>
-          <a:solidFill>
-            <a:schemeClr val="accent3">
-              <a:lumMod val="75000"/>
-            </a:schemeClr>
-          </a:solidFill>
-          <a:ln w="12700">
-            <a:noFill/>
-          </a:ln>
-        </p:spPr>
-        <p:style>
-          <a:lnRef idx="2">
-            <a:schemeClr val="accent1">
-              <a:shade val="50000"/>
-            </a:schemeClr>
-          </a:lnRef>
-          <a:fillRef idx="1">
-            <a:schemeClr val="accent1"/>
-          </a:fillRef>
-          <a:effectRef idx="0">
-            <a:schemeClr val="accent1"/>
-          </a:effectRef>
-          <a:fontRef idx="minor"/>
-        </p:style>
-        <p:txBody>
-          <a:bodyPr lIns="90000" rIns="90000" tIns="45000" bIns="45000">
-            <a:noAutofit/>
-          </a:bodyPr>
-          <a:p>
-            <a:pPr algn="ctr">
-              <a:lnSpc>
-                <a:spcPct val="100000"/>
-              </a:lnSpc>
-            </a:pPr>
-            <a:r>
-              <a:rPr b="1" lang="fr-FR" sz="1100" spc="-1" strike="noStrike">
-                <a:solidFill>
-                  <a:srgbClr val="ffffff"/>
-                </a:solidFill>
-                <a:latin typeface="Arial"/>
-                <a:ea typeface="DejaVu Sans"/>
-              </a:rPr>
-              <a:t>Fournisseurs et Stock</a:t>
-            </a:r>
-            <a:endParaRPr b="0" lang="fr-FR" sz="1100" spc="-1" strike="noStrike">
-              <a:latin typeface="Arial"/>
-            </a:endParaRPr>
-          </a:p>
-        </p:txBody>
-      </p:sp>
-      <p:sp>
-        <p:nvSpPr>
-          <p:cNvPr id="131" name="CustomShape 12"/>
-          <p:cNvSpPr/>
-          <p:nvPr/>
-        </p:nvSpPr>
-        <p:spPr>
-          <a:xfrm>
-            <a:off x="1571040" y="5861880"/>
-            <a:ext cx="1808280" cy="437760"/>
-          </a:xfrm>
-          <a:prstGeom prst="roundRect">
-            <a:avLst>
-              <a:gd name="adj" fmla="val 100000"/>
-            </a:avLst>
-          </a:prstGeom>
-          <a:solidFill>
-            <a:srgbClr val="618197"/>
-          </a:solidFill>
-          <a:ln w="12700">
-            <a:noFill/>
-          </a:ln>
-        </p:spPr>
-        <p:style>
-          <a:lnRef idx="2">
-            <a:schemeClr val="accent1">
-              <a:shade val="50000"/>
-            </a:schemeClr>
-          </a:lnRef>
-          <a:fillRef idx="1">
-            <a:schemeClr val="accent1"/>
-          </a:fillRef>
-          <a:effectRef idx="0">
-            <a:schemeClr val="accent1"/>
-          </a:effectRef>
-          <a:fontRef idx="minor"/>
-        </p:style>
-        <p:txBody>
-          <a:bodyPr lIns="90000" rIns="90000" tIns="45000" bIns="45000">
-            <a:noAutofit/>
-          </a:bodyPr>
-          <a:p>
-            <a:pPr algn="ctr">
-              <a:lnSpc>
-                <a:spcPct val="100000"/>
-              </a:lnSpc>
-            </a:pPr>
-            <a:r>
-              <a:rPr b="1" lang="fr-FR" sz="1200" spc="-1" strike="noStrike">
-                <a:solidFill>
-                  <a:srgbClr val="ffffff"/>
-                </a:solidFill>
-                <a:latin typeface="Arial"/>
-                <a:ea typeface="DejaVu Sans"/>
-              </a:rPr>
-              <a:t>Automatisation des RDV Clients</a:t>
-            </a:r>
-            <a:endParaRPr b="0" lang="fr-FR" sz="1200" spc="-1" strike="noStrike">
-              <a:latin typeface="Arial"/>
-            </a:endParaRPr>
-          </a:p>
-        </p:txBody>
-      </p:sp>
-      <p:sp>
-        <p:nvSpPr>
-          <p:cNvPr id="132" name="CustomShape 13"/>
-          <p:cNvSpPr/>
-          <p:nvPr/>
-        </p:nvSpPr>
-        <p:spPr>
-          <a:xfrm>
-            <a:off x="1980000" y="4320000"/>
-            <a:ext cx="1619640" cy="179640"/>
-          </a:xfrm>
-          <a:prstGeom prst="roundRect">
-            <a:avLst>
-              <a:gd name="adj" fmla="val 100000"/>
-            </a:avLst>
-          </a:prstGeom>
-          <a:solidFill>
-            <a:schemeClr val="accent5"/>
-          </a:solidFill>
-          <a:ln w="12700">
-            <a:noFill/>
-          </a:ln>
-        </p:spPr>
-        <p:style>
-          <a:lnRef idx="2">
-            <a:schemeClr val="accent1">
-              <a:shade val="50000"/>
-            </a:schemeClr>
-          </a:lnRef>
-          <a:fillRef idx="1">
-            <a:schemeClr val="accent1"/>
-          </a:fillRef>
-          <a:effectRef idx="0">
-            <a:schemeClr val="accent1"/>
-          </a:effectRef>
-          <a:fontRef idx="minor"/>
-        </p:style>
-        <p:txBody>
-          <a:bodyPr lIns="90000" rIns="90000" tIns="45000" bIns="45000">
-            <a:noAutofit/>
-          </a:bodyPr>
-          <a:p>
-            <a:pPr algn="ctr">
-              <a:lnSpc>
-                <a:spcPct val="100000"/>
-              </a:lnSpc>
-            </a:pPr>
-            <a:r>
-              <a:rPr b="1" lang="fr-FR" sz="800" spc="-1" strike="noStrike">
-                <a:solidFill>
-                  <a:srgbClr val="ffffff"/>
-                </a:solidFill>
-                <a:latin typeface="Arial"/>
-                <a:ea typeface="DejaVu Sans"/>
-              </a:rPr>
-              <a:t>Implémentation du CRM</a:t>
-            </a:r>
-            <a:endParaRPr b="0" lang="fr-FR" sz="800" spc="-1" strike="noStrike">
-              <a:latin typeface="Arial"/>
-            </a:endParaRPr>
-          </a:p>
-        </p:txBody>
-      </p:sp>
-      <p:sp>
-        <p:nvSpPr>
-          <p:cNvPr id="133" name="CustomShape 14"/>
-          <p:cNvSpPr/>
-          <p:nvPr/>
-        </p:nvSpPr>
-        <p:spPr>
-          <a:xfrm>
-            <a:off x="1260000" y="1260000"/>
-            <a:ext cx="8099640" cy="454320"/>
-          </a:xfrm>
-          <a:prstGeom prst="roundRect">
-            <a:avLst>
-              <a:gd name="adj" fmla="val 10000000"/>
-            </a:avLst>
-          </a:prstGeom>
-          <a:solidFill>
-            <a:srgbClr val="ff0000">
-              <a:alpha val="30000"/>
-            </a:srgbClr>
-          </a:solidFill>
-          <a:ln w="12700">
-            <a:noFill/>
-          </a:ln>
-        </p:spPr>
-        <p:style>
-          <a:lnRef idx="2">
-            <a:schemeClr val="accent1">
-              <a:shade val="50000"/>
-            </a:schemeClr>
-          </a:lnRef>
-          <a:fillRef idx="1">
-            <a:schemeClr val="accent1"/>
-          </a:fillRef>
-          <a:effectRef idx="0">
-            <a:schemeClr val="accent1"/>
-          </a:effectRef>
-          <a:fontRef idx="minor"/>
-        </p:style>
-      </p:sp>
-      <p:sp>
-        <p:nvSpPr>
-          <p:cNvPr id="134" name="CustomShape 15"/>
-          <p:cNvSpPr/>
-          <p:nvPr/>
-        </p:nvSpPr>
-        <p:spPr>
-          <a:xfrm>
-            <a:off x="63360" y="2377080"/>
-            <a:ext cx="1180080" cy="489960"/>
-          </a:xfrm>
-          <a:prstGeom prst="rect">
-            <a:avLst/>
-          </a:prstGeom>
-          <a:noFill/>
-          <a:ln w="0">
-            <a:noFill/>
-          </a:ln>
-        </p:spPr>
-        <p:style>
-          <a:lnRef idx="0"/>
-          <a:fillRef idx="0"/>
-          <a:effectRef idx="0"/>
-          <a:fontRef idx="minor"/>
-        </p:style>
-        <p:txBody>
-          <a:bodyPr lIns="0" rIns="0" tIns="0" bIns="0" anchor="ctr">
-            <a:noAutofit/>
-          </a:bodyPr>
-          <a:p>
-            <a:pPr algn="ctr">
-              <a:lnSpc>
-                <a:spcPct val="100000"/>
-              </a:lnSpc>
-              <a:tabLst>
-                <a:tab algn="l" pos="0"/>
-              </a:tabLst>
-            </a:pPr>
-            <a:r>
-              <a:rPr b="0" lang="en-US" sz="1200" spc="-1" strike="noStrike">
-                <a:solidFill>
-                  <a:srgbClr val="232325"/>
-                </a:solidFill>
-                <a:latin typeface="MV Boli"/>
-                <a:ea typeface="Adobe Heiti Std R"/>
-              </a:rPr>
-              <a:t>Etapes clés</a:t>
-            </a:r>
-            <a:endParaRPr b="0" lang="fr-FR" sz="1200" spc="-1" strike="noStrike">
-              <a:latin typeface="Arial"/>
-            </a:endParaRPr>
-          </a:p>
-        </p:txBody>
-      </p:sp>
-      <p:sp>
-        <p:nvSpPr>
-          <p:cNvPr id="135" name="CustomShape 16"/>
-          <p:cNvSpPr/>
-          <p:nvPr/>
-        </p:nvSpPr>
-        <p:spPr>
-          <a:xfrm>
-            <a:off x="63360" y="3631320"/>
-            <a:ext cx="1180080" cy="244440"/>
-          </a:xfrm>
-          <a:prstGeom prst="rect">
-            <a:avLst/>
-          </a:prstGeom>
-          <a:noFill/>
-          <a:ln w="0">
-            <a:noFill/>
-          </a:ln>
-        </p:spPr>
-        <p:style>
-          <a:lnRef idx="0"/>
-          <a:fillRef idx="0"/>
-          <a:effectRef idx="0"/>
-          <a:fontRef idx="minor"/>
-        </p:style>
-        <p:txBody>
-          <a:bodyPr lIns="0" rIns="0" tIns="0" bIns="0" anchor="ctr">
-            <a:noAutofit/>
-          </a:bodyPr>
-          <a:p>
-            <a:pPr algn="ctr">
-              <a:lnSpc>
-                <a:spcPct val="100000"/>
-              </a:lnSpc>
-              <a:tabLst>
-                <a:tab algn="l" pos="0"/>
-              </a:tabLst>
-            </a:pPr>
-            <a:r>
-              <a:rPr b="0" lang="en-US" sz="1200" spc="-1" strike="noStrike">
-                <a:solidFill>
-                  <a:srgbClr val="232325"/>
-                </a:solidFill>
-                <a:latin typeface="MV Boli"/>
-                <a:ea typeface="Adobe Heiti Std R"/>
-              </a:rPr>
-              <a:t>Les livrables</a:t>
-            </a:r>
-            <a:endParaRPr b="0" lang="fr-FR" sz="1200" spc="-1" strike="noStrike">
-              <a:latin typeface="Arial"/>
-            </a:endParaRPr>
-          </a:p>
-        </p:txBody>
-      </p:sp>
-      <p:sp>
-        <p:nvSpPr>
-          <p:cNvPr id="136" name="CustomShape 17"/>
-          <p:cNvSpPr/>
-          <p:nvPr/>
-        </p:nvSpPr>
-        <p:spPr>
-          <a:xfrm>
-            <a:off x="0" y="4860000"/>
-            <a:ext cx="1180080" cy="489960"/>
-          </a:xfrm>
-          <a:prstGeom prst="rect">
-            <a:avLst/>
-          </a:prstGeom>
-          <a:noFill/>
-          <a:ln w="0">
-            <a:noFill/>
-          </a:ln>
-        </p:spPr>
-        <p:style>
-          <a:lnRef idx="0"/>
-          <a:fillRef idx="0"/>
-          <a:effectRef idx="0"/>
-          <a:fontRef idx="minor"/>
-        </p:style>
-        <p:txBody>
-          <a:bodyPr lIns="0" rIns="0" tIns="0" bIns="0" anchor="ctr">
-            <a:noAutofit/>
-          </a:bodyPr>
-          <a:p>
-            <a:pPr algn="ctr">
-              <a:lnSpc>
-                <a:spcPct val="100000"/>
-              </a:lnSpc>
-              <a:tabLst>
-                <a:tab algn="l" pos="0"/>
-              </a:tabLst>
-            </a:pPr>
-            <a:r>
-              <a:rPr b="0" lang="en-US" sz="1200" spc="-1" strike="noStrike">
-                <a:solidFill>
-                  <a:srgbClr val="47313a"/>
-                </a:solidFill>
-                <a:latin typeface="MV Boli"/>
-                <a:ea typeface="Adobe Heiti Std R"/>
-              </a:rPr>
-              <a:t>Responsabilités</a:t>
-            </a:r>
-            <a:endParaRPr b="0" lang="fr-FR" sz="1200" spc="-1" strike="noStrike">
-              <a:latin typeface="Arial"/>
-            </a:endParaRPr>
-          </a:p>
-        </p:txBody>
-      </p:sp>
-      <p:sp>
-        <p:nvSpPr>
-          <p:cNvPr id="137" name="CustomShape 18"/>
-          <p:cNvSpPr/>
-          <p:nvPr/>
-        </p:nvSpPr>
-        <p:spPr>
-          <a:xfrm flipV="1" rot="362400">
-            <a:off x="1614600" y="521280"/>
-            <a:ext cx="355680" cy="182880"/>
-          </a:xfrm>
-          <a:prstGeom prst="rect">
-            <a:avLst/>
-          </a:prstGeom>
-          <a:noFill/>
-          <a:ln w="0">
-            <a:noFill/>
-          </a:ln>
-        </p:spPr>
-        <p:style>
-          <a:lnRef idx="0"/>
-          <a:fillRef idx="0"/>
-          <a:effectRef idx="0"/>
-          <a:fontRef idx="minor"/>
-        </p:style>
-        <p:txBody>
-          <a:bodyPr wrap="none" lIns="0" rIns="0" tIns="0" bIns="0" anchor="ctr">
-            <a:spAutoFit/>
-          </a:bodyPr>
-          <a:p>
-            <a:pPr algn="ctr">
-              <a:lnSpc>
-                <a:spcPct val="100000"/>
-              </a:lnSpc>
-              <a:tabLst>
-                <a:tab algn="l" pos="0"/>
-              </a:tabLst>
-            </a:pPr>
-            <a:r>
-              <a:rPr b="0" lang="en-US" sz="1200" spc="-12" strike="noStrike">
-                <a:solidFill>
-                  <a:srgbClr val="000000"/>
-                </a:solidFill>
-                <a:latin typeface="Calibri"/>
-                <a:ea typeface="DejaVu Sans"/>
-              </a:rPr>
-              <a:t>Today</a:t>
-            </a:r>
-            <a:endParaRPr b="0" lang="fr-FR" sz="1200" spc="-1" strike="noStrike">
-              <a:latin typeface="Arial"/>
-            </a:endParaRPr>
-          </a:p>
-        </p:txBody>
-      </p:sp>
-      <p:sp>
-        <p:nvSpPr>
-          <p:cNvPr id="138" name="CustomShape 19"/>
-          <p:cNvSpPr/>
-          <p:nvPr/>
-        </p:nvSpPr>
-        <p:spPr>
-          <a:xfrm>
-            <a:off x="1433520" y="1397880"/>
-            <a:ext cx="407520" cy="253080"/>
-          </a:xfrm>
-          <a:prstGeom prst="rect">
-            <a:avLst/>
-          </a:prstGeom>
-          <a:noFill/>
-          <a:ln w="0">
-            <a:noFill/>
-          </a:ln>
-        </p:spPr>
-        <p:style>
-          <a:lnRef idx="0"/>
-          <a:fillRef idx="0"/>
-          <a:effectRef idx="0"/>
-          <a:fontRef idx="minor"/>
-        </p:style>
-        <p:txBody>
-          <a:bodyPr wrap="none" lIns="0" rIns="0" tIns="0" bIns="0" anchor="ctr">
-            <a:noAutofit/>
-          </a:bodyPr>
-          <a:p>
-            <a:pPr>
-              <a:lnSpc>
-                <a:spcPct val="100000"/>
-              </a:lnSpc>
-              <a:tabLst>
-                <a:tab algn="l" pos="0"/>
-              </a:tabLst>
-            </a:pPr>
-            <a:r>
-              <a:rPr b="0" lang="en-US" sz="1400" spc="-32" strike="noStrike">
-                <a:solidFill>
-                  <a:srgbClr val="ffffff"/>
-                </a:solidFill>
-                <a:latin typeface="MV Boli"/>
-                <a:ea typeface="DejaVu Sans"/>
-              </a:rPr>
-              <a:t>Avril</a:t>
-            </a:r>
-            <a:endParaRPr b="0" lang="fr-FR" sz="1400" spc="-1" strike="noStrike">
-              <a:latin typeface="Arial"/>
-            </a:endParaRPr>
-          </a:p>
-        </p:txBody>
-      </p:sp>
-      <p:sp>
-        <p:nvSpPr>
-          <p:cNvPr id="139" name="CustomShape 20"/>
-          <p:cNvSpPr/>
-          <p:nvPr/>
-        </p:nvSpPr>
-        <p:spPr>
-          <a:xfrm>
-            <a:off x="3443400" y="1397880"/>
-            <a:ext cx="516240" cy="253080"/>
-          </a:xfrm>
-          <a:prstGeom prst="rect">
-            <a:avLst/>
-          </a:prstGeom>
-          <a:noFill/>
-          <a:ln w="0">
-            <a:noFill/>
-          </a:ln>
-        </p:spPr>
-        <p:style>
-          <a:lnRef idx="0"/>
-          <a:fillRef idx="0"/>
-          <a:effectRef idx="0"/>
-          <a:fontRef idx="minor"/>
-        </p:style>
-        <p:txBody>
-          <a:bodyPr wrap="none" lIns="0" rIns="0" tIns="0" bIns="0" anchor="ctr">
-            <a:noAutofit/>
-          </a:bodyPr>
-          <a:p>
-            <a:pPr>
-              <a:lnSpc>
-                <a:spcPct val="100000"/>
-              </a:lnSpc>
-              <a:tabLst>
-                <a:tab algn="l" pos="0"/>
-              </a:tabLst>
-            </a:pPr>
-            <a:r>
-              <a:rPr b="0" lang="en-US" sz="1400" spc="-32" strike="noStrike">
-                <a:solidFill>
-                  <a:srgbClr val="ffffff"/>
-                </a:solidFill>
-                <a:latin typeface="MV Boli"/>
-                <a:ea typeface="DejaVu Sans"/>
-              </a:rPr>
-              <a:t>Mai</a:t>
-            </a:r>
-            <a:endParaRPr b="0" lang="fr-FR" sz="1400" spc="-1" strike="noStrike">
-              <a:latin typeface="Arial"/>
-            </a:endParaRPr>
-          </a:p>
-        </p:txBody>
-      </p:sp>
-      <p:sp>
-        <p:nvSpPr>
-          <p:cNvPr id="140" name="CustomShape 21"/>
-          <p:cNvSpPr/>
-          <p:nvPr/>
-        </p:nvSpPr>
-        <p:spPr>
-          <a:xfrm>
-            <a:off x="5520240" y="1397880"/>
-            <a:ext cx="551160" cy="253080"/>
-          </a:xfrm>
-          <a:prstGeom prst="rect">
-            <a:avLst/>
-          </a:prstGeom>
-          <a:noFill/>
-          <a:ln w="0">
-            <a:noFill/>
-          </a:ln>
-        </p:spPr>
-        <p:style>
-          <a:lnRef idx="0"/>
-          <a:fillRef idx="0"/>
-          <a:effectRef idx="0"/>
-          <a:fontRef idx="minor"/>
-        </p:style>
-        <p:txBody>
-          <a:bodyPr wrap="none" lIns="0" rIns="0" tIns="0" bIns="0" anchor="ctr">
-            <a:noAutofit/>
-          </a:bodyPr>
-          <a:p>
-            <a:pPr>
-              <a:lnSpc>
-                <a:spcPct val="100000"/>
-              </a:lnSpc>
-              <a:tabLst>
-                <a:tab algn="l" pos="0"/>
-              </a:tabLst>
-            </a:pPr>
-            <a:r>
-              <a:rPr b="0" lang="en-US" sz="1400" spc="-32" strike="noStrike">
-                <a:solidFill>
-                  <a:srgbClr val="ffffff"/>
-                </a:solidFill>
-                <a:latin typeface="MV Boli"/>
-                <a:ea typeface="DejaVu Sans"/>
-              </a:rPr>
-              <a:t>Juin</a:t>
-            </a:r>
-            <a:endParaRPr b="0" lang="fr-FR" sz="1400" spc="-1" strike="noStrike">
-              <a:latin typeface="Arial"/>
-            </a:endParaRPr>
-          </a:p>
-        </p:txBody>
-      </p:sp>
-      <p:sp>
-        <p:nvSpPr>
-          <p:cNvPr id="141" name="CustomShape 22"/>
-          <p:cNvSpPr/>
-          <p:nvPr/>
-        </p:nvSpPr>
-        <p:spPr>
-          <a:xfrm>
-            <a:off x="7597080" y="1397880"/>
-            <a:ext cx="861840" cy="253080"/>
-          </a:xfrm>
-          <a:prstGeom prst="rect">
-            <a:avLst/>
-          </a:prstGeom>
-          <a:noFill/>
-          <a:ln w="0">
-            <a:noFill/>
-          </a:ln>
-        </p:spPr>
-        <p:style>
-          <a:lnRef idx="0"/>
-          <a:fillRef idx="0"/>
-          <a:effectRef idx="0"/>
-          <a:fontRef idx="minor"/>
-        </p:style>
-        <p:txBody>
-          <a:bodyPr wrap="none" lIns="0" rIns="0" tIns="0" bIns="0" anchor="ctr">
-            <a:noAutofit/>
-          </a:bodyPr>
-          <a:p>
-            <a:pPr>
-              <a:lnSpc>
-                <a:spcPct val="100000"/>
-              </a:lnSpc>
-              <a:tabLst>
-                <a:tab algn="l" pos="0"/>
-              </a:tabLst>
-            </a:pPr>
-            <a:r>
-              <a:rPr b="0" lang="en-US" sz="1400" spc="-32" strike="noStrike">
-                <a:solidFill>
-                  <a:srgbClr val="ffffff"/>
-                </a:solidFill>
-                <a:latin typeface="MV Boli"/>
-                <a:ea typeface="DejaVu Sans"/>
-              </a:rPr>
-              <a:t>Juillet</a:t>
-            </a:r>
-            <a:endParaRPr b="0" lang="fr-FR" sz="1400" spc="-1" strike="noStrike">
-              <a:latin typeface="Arial"/>
-            </a:endParaRPr>
-          </a:p>
-        </p:txBody>
-      </p:sp>
-      <p:sp>
-        <p:nvSpPr>
-          <p:cNvPr id="142" name="CustomShape 23"/>
-          <p:cNvSpPr/>
-          <p:nvPr/>
-        </p:nvSpPr>
-        <p:spPr>
-          <a:xfrm>
-            <a:off x="8569440" y="2379240"/>
-            <a:ext cx="964080" cy="167400"/>
-          </a:xfrm>
-          <a:prstGeom prst="rect">
-            <a:avLst/>
-          </a:prstGeom>
-          <a:noFill/>
-          <a:ln w="0">
-            <a:noFill/>
-          </a:ln>
-        </p:spPr>
-        <p:style>
-          <a:lnRef idx="0"/>
-          <a:fillRef idx="0"/>
-          <a:effectRef idx="0"/>
-          <a:fontRef idx="minor"/>
-        </p:style>
-      </p:sp>
-      <p:sp>
-        <p:nvSpPr>
-          <p:cNvPr id="143" name="CustomShape 24"/>
-          <p:cNvSpPr/>
-          <p:nvPr/>
-        </p:nvSpPr>
-        <p:spPr>
-          <a:xfrm>
-            <a:off x="10847160" y="6295320"/>
-            <a:ext cx="570600" cy="167400"/>
-          </a:xfrm>
-          <a:prstGeom prst="rect">
-            <a:avLst/>
-          </a:prstGeom>
-          <a:noFill/>
-          <a:ln w="0">
-            <a:noFill/>
-          </a:ln>
-        </p:spPr>
-        <p:style>
-          <a:lnRef idx="0"/>
-          <a:fillRef idx="0"/>
-          <a:effectRef idx="0"/>
-          <a:fontRef idx="minor"/>
-        </p:style>
-      </p:sp>
-      <p:sp>
-        <p:nvSpPr>
-          <p:cNvPr id="144" name="CustomShape 25"/>
-          <p:cNvSpPr/>
-          <p:nvPr/>
-        </p:nvSpPr>
-        <p:spPr>
-          <a:xfrm>
-            <a:off x="9000360" y="5992200"/>
-            <a:ext cx="608400" cy="167400"/>
-          </a:xfrm>
-          <a:prstGeom prst="rect">
-            <a:avLst/>
-          </a:prstGeom>
-          <a:noFill/>
-          <a:ln w="0">
-            <a:noFill/>
-          </a:ln>
-        </p:spPr>
-        <p:style>
-          <a:lnRef idx="0"/>
-          <a:fillRef idx="0"/>
-          <a:effectRef idx="0"/>
-          <a:fontRef idx="minor"/>
-        </p:style>
-      </p:sp>
-      <p:sp>
-        <p:nvSpPr>
-          <p:cNvPr id="145" name="CustomShape 26"/>
-          <p:cNvSpPr/>
-          <p:nvPr/>
-        </p:nvSpPr>
-        <p:spPr>
-          <a:xfrm>
-            <a:off x="6136200" y="2696760"/>
-            <a:ext cx="1307160" cy="167400"/>
-          </a:xfrm>
-          <a:prstGeom prst="rect">
-            <a:avLst/>
-          </a:prstGeom>
-          <a:noFill/>
-          <a:ln w="0">
-            <a:noFill/>
-          </a:ln>
-        </p:spPr>
-        <p:style>
-          <a:lnRef idx="0"/>
-          <a:fillRef idx="0"/>
-          <a:effectRef idx="0"/>
-          <a:fontRef idx="minor"/>
-        </p:style>
-      </p:sp>
-      <p:sp>
-        <p:nvSpPr>
-          <p:cNvPr id="146" name="CustomShape 27"/>
-          <p:cNvSpPr/>
-          <p:nvPr/>
-        </p:nvSpPr>
-        <p:spPr>
-          <a:xfrm>
-            <a:off x="7643520" y="4912920"/>
-            <a:ext cx="570600" cy="203400"/>
-          </a:xfrm>
-          <a:prstGeom prst="rect">
-            <a:avLst/>
-          </a:prstGeom>
-          <a:noFill/>
-          <a:ln w="0">
-            <a:noFill/>
-          </a:ln>
-        </p:spPr>
-        <p:style>
-          <a:lnRef idx="0"/>
-          <a:fillRef idx="0"/>
-          <a:effectRef idx="0"/>
-          <a:fontRef idx="minor"/>
-        </p:style>
-        <p:txBody>
-          <a:bodyPr lIns="0" rIns="0" tIns="0" bIns="0" anchor="ctr">
-            <a:noAutofit/>
-          </a:bodyPr>
-          <a:p>
-            <a:pPr algn="ctr">
-              <a:lnSpc>
-                <a:spcPct val="100000"/>
-              </a:lnSpc>
-              <a:tabLst>
-                <a:tab algn="l" pos="0"/>
-              </a:tabLst>
-            </a:pPr>
-            <a:r>
-              <a:rPr b="0" lang="en-US" sz="1000" spc="-24" strike="noStrike">
-                <a:solidFill>
-                  <a:srgbClr val="ffffff"/>
-                </a:solidFill>
-                <a:latin typeface="MV Boli"/>
-                <a:ea typeface="DejaVu Sans"/>
-              </a:rPr>
-              <a:t>Migration</a:t>
-            </a:r>
-            <a:endParaRPr b="0" lang="fr-FR" sz="1000" spc="-1" strike="noStrike">
-              <a:latin typeface="Arial"/>
-            </a:endParaRPr>
-          </a:p>
-        </p:txBody>
-      </p:sp>
-      <p:sp>
-        <p:nvSpPr>
-          <p:cNvPr id="147" name="CustomShape 28"/>
-          <p:cNvSpPr/>
-          <p:nvPr/>
-        </p:nvSpPr>
-        <p:spPr>
-          <a:xfrm>
-            <a:off x="9300960" y="5595120"/>
-            <a:ext cx="570600" cy="203400"/>
-          </a:xfrm>
-          <a:prstGeom prst="rect">
-            <a:avLst/>
-          </a:prstGeom>
-          <a:noFill/>
-          <a:ln w="0">
-            <a:noFill/>
-          </a:ln>
-        </p:spPr>
-        <p:style>
-          <a:lnRef idx="0"/>
-          <a:fillRef idx="0"/>
-          <a:effectRef idx="0"/>
-          <a:fontRef idx="minor"/>
-        </p:style>
-        <p:txBody>
-          <a:bodyPr lIns="0" rIns="0" tIns="0" bIns="0" anchor="ctr">
-            <a:noAutofit/>
-          </a:bodyPr>
-          <a:p>
-            <a:pPr algn="ctr">
-              <a:lnSpc>
-                <a:spcPct val="100000"/>
-              </a:lnSpc>
-              <a:tabLst>
-                <a:tab algn="l" pos="0"/>
-              </a:tabLst>
-            </a:pPr>
-            <a:r>
-              <a:rPr b="0" lang="en-US" sz="1000" spc="-24" strike="noStrike">
-                <a:solidFill>
-                  <a:srgbClr val="ffffff"/>
-                </a:solidFill>
-                <a:latin typeface="MV Boli"/>
-                <a:ea typeface="DejaVu Sans"/>
-              </a:rPr>
-              <a:t>Migration</a:t>
-            </a:r>
-            <a:endParaRPr b="0" lang="fr-FR" sz="1000" spc="-1" strike="noStrike">
-              <a:latin typeface="Arial"/>
-            </a:endParaRPr>
-          </a:p>
-        </p:txBody>
-      </p:sp>
-      <p:sp>
-        <p:nvSpPr>
-          <p:cNvPr id="148" name="CustomShape 29"/>
-          <p:cNvSpPr/>
-          <p:nvPr/>
-        </p:nvSpPr>
-        <p:spPr>
-          <a:xfrm>
-            <a:off x="7296120" y="5999760"/>
-            <a:ext cx="938880" cy="152280"/>
-          </a:xfrm>
-          <a:prstGeom prst="rect">
-            <a:avLst/>
-          </a:prstGeom>
-          <a:noFill/>
-          <a:ln w="0">
-            <a:noFill/>
-          </a:ln>
-        </p:spPr>
-        <p:style>
-          <a:lnRef idx="0"/>
-          <a:fillRef idx="0"/>
-          <a:effectRef idx="0"/>
-          <a:fontRef idx="minor"/>
-        </p:style>
-        <p:txBody>
-          <a:bodyPr lIns="0" rIns="0" tIns="0" bIns="0" anchor="ctr">
-            <a:spAutoFit/>
-          </a:bodyPr>
-          <a:p>
-            <a:pPr algn="ctr">
-              <a:lnSpc>
-                <a:spcPct val="100000"/>
-              </a:lnSpc>
-              <a:tabLst>
-                <a:tab algn="l" pos="0"/>
-              </a:tabLst>
-            </a:pPr>
-            <a:r>
-              <a:rPr b="0" lang="en-US" sz="1000" spc="-21" strike="noStrike">
-                <a:solidFill>
-                  <a:srgbClr val="ffffff"/>
-                </a:solidFill>
-                <a:latin typeface="MV Boli"/>
-                <a:ea typeface="DejaVu Sans"/>
-              </a:rPr>
-              <a:t>Communications</a:t>
-            </a:r>
-            <a:endParaRPr b="0" lang="fr-FR" sz="1000" spc="-1" strike="noStrike">
-              <a:latin typeface="Arial"/>
-            </a:endParaRPr>
-          </a:p>
-        </p:txBody>
-      </p:sp>
-      <p:sp>
-        <p:nvSpPr>
-          <p:cNvPr id="149" name="CustomShape 30"/>
-          <p:cNvSpPr/>
-          <p:nvPr/>
-        </p:nvSpPr>
-        <p:spPr>
-          <a:xfrm>
-            <a:off x="6644520" y="3076200"/>
-            <a:ext cx="1116360" cy="167400"/>
-          </a:xfrm>
-          <a:prstGeom prst="rect">
-            <a:avLst/>
-          </a:prstGeom>
-          <a:noFill/>
-          <a:ln w="0">
-            <a:noFill/>
-          </a:ln>
-        </p:spPr>
-        <p:style>
-          <a:lnRef idx="0"/>
-          <a:fillRef idx="0"/>
-          <a:effectRef idx="0"/>
-          <a:fontRef idx="minor"/>
-        </p:style>
-      </p:sp>
-      <p:sp>
-        <p:nvSpPr>
-          <p:cNvPr id="150" name="Line 31"/>
-          <p:cNvSpPr/>
-          <p:nvPr/>
-        </p:nvSpPr>
-        <p:spPr>
-          <a:xfrm>
-            <a:off x="3379680" y="1397520"/>
-            <a:ext cx="0" cy="254160"/>
-          </a:xfrm>
-          <a:prstGeom prst="line">
-            <a:avLst/>
-          </a:prstGeom>
-          <a:ln>
-            <a:solidFill>
-              <a:schemeClr val="lt1">
-                <a:alpha val="29804"/>
-              </a:schemeClr>
-            </a:solidFill>
-          </a:ln>
-        </p:spPr>
-        <p:style>
-          <a:lnRef idx="1">
-            <a:schemeClr val="accent1"/>
-          </a:lnRef>
-          <a:fillRef idx="0">
-            <a:schemeClr val="accent1"/>
-          </a:fillRef>
-          <a:effectRef idx="0">
-            <a:schemeClr val="accent1"/>
-          </a:effectRef>
-          <a:fontRef idx="minor"/>
-        </p:style>
-      </p:sp>
-      <p:sp>
-        <p:nvSpPr>
-          <p:cNvPr id="151" name="Line 32"/>
-          <p:cNvSpPr/>
-          <p:nvPr/>
-        </p:nvSpPr>
-        <p:spPr>
-          <a:xfrm>
-            <a:off x="5456520" y="1397520"/>
-            <a:ext cx="0" cy="254160"/>
-          </a:xfrm>
-          <a:prstGeom prst="line">
-            <a:avLst/>
-          </a:prstGeom>
-          <a:ln>
-            <a:solidFill>
-              <a:schemeClr val="lt1">
-                <a:alpha val="29804"/>
-              </a:schemeClr>
-            </a:solidFill>
-          </a:ln>
-        </p:spPr>
-        <p:style>
-          <a:lnRef idx="1">
-            <a:schemeClr val="accent1"/>
-          </a:lnRef>
-          <a:fillRef idx="0">
-            <a:schemeClr val="accent1"/>
-          </a:fillRef>
-          <a:effectRef idx="0">
-            <a:schemeClr val="accent1"/>
-          </a:effectRef>
-          <a:fontRef idx="minor"/>
-        </p:style>
-      </p:sp>
-      <p:sp>
-        <p:nvSpPr>
-          <p:cNvPr id="152" name="Line 33"/>
-          <p:cNvSpPr/>
-          <p:nvPr/>
-        </p:nvSpPr>
-        <p:spPr>
-          <a:xfrm>
-            <a:off x="7533360" y="1397520"/>
-            <a:ext cx="0" cy="254160"/>
-          </a:xfrm>
-          <a:prstGeom prst="line">
-            <a:avLst/>
-          </a:prstGeom>
-          <a:ln>
-            <a:solidFill>
-              <a:schemeClr val="lt1">
-                <a:alpha val="29804"/>
-              </a:schemeClr>
-            </a:solidFill>
-          </a:ln>
-        </p:spPr>
-        <p:style>
-          <a:lnRef idx="1">
-            <a:schemeClr val="accent1"/>
-          </a:lnRef>
-          <a:fillRef idx="0">
-            <a:schemeClr val="accent1"/>
-          </a:fillRef>
-          <a:effectRef idx="0">
-            <a:schemeClr val="accent1"/>
-          </a:effectRef>
-          <a:fontRef idx="minor"/>
-        </p:style>
-      </p:sp>
-      <p:sp>
-        <p:nvSpPr>
-          <p:cNvPr id="153" name="Line 34"/>
-          <p:cNvSpPr/>
-          <p:nvPr/>
-        </p:nvSpPr>
-        <p:spPr>
-          <a:xfrm>
-            <a:off x="9543240" y="1397520"/>
-            <a:ext cx="0" cy="254160"/>
-          </a:xfrm>
-          <a:prstGeom prst="line">
-            <a:avLst/>
-          </a:prstGeom>
-          <a:ln>
-            <a:solidFill>
-              <a:schemeClr val="lt1">
-                <a:alpha val="29804"/>
-              </a:schemeClr>
-            </a:solidFill>
-          </a:ln>
-        </p:spPr>
-        <p:style>
-          <a:lnRef idx="1">
-            <a:schemeClr val="accent1"/>
-          </a:lnRef>
-          <a:fillRef idx="0">
-            <a:schemeClr val="accent1"/>
-          </a:fillRef>
-          <a:effectRef idx="0">
-            <a:schemeClr val="accent1"/>
-          </a:effectRef>
-          <a:fontRef idx="minor"/>
-        </p:style>
-      </p:sp>
-      <p:sp>
-        <p:nvSpPr>
-          <p:cNvPr id="154" name="CustomShape 35"/>
-          <p:cNvSpPr/>
-          <p:nvPr/>
-        </p:nvSpPr>
-        <p:spPr>
-          <a:xfrm>
-            <a:off x="3547080" y="180000"/>
-            <a:ext cx="2572560" cy="425160"/>
-          </a:xfrm>
-          <a:prstGeom prst="rect">
-            <a:avLst/>
-          </a:prstGeom>
-          <a:noFill/>
-          <a:ln w="0">
-            <a:noFill/>
-          </a:ln>
-        </p:spPr>
-        <p:style>
-          <a:lnRef idx="0"/>
-          <a:fillRef idx="0"/>
-          <a:effectRef idx="0"/>
-          <a:fontRef idx="minor"/>
-        </p:style>
-        <p:txBody>
-          <a:bodyPr lIns="90000" rIns="90000" tIns="45000" bIns="45000">
-            <a:spAutoFit/>
-          </a:bodyPr>
-          <a:p>
-            <a:pPr>
-              <a:lnSpc>
-                <a:spcPct val="100000"/>
-              </a:lnSpc>
-            </a:pPr>
-            <a:r>
-              <a:rPr b="0" lang="en-GB" sz="2200" spc="-1" strike="noStrike">
-                <a:solidFill>
-                  <a:srgbClr val="000000"/>
-                </a:solidFill>
-                <a:latin typeface="Segoe UI"/>
-                <a:ea typeface="DejaVu Sans"/>
-              </a:rPr>
-              <a:t>Rep’Aero RoadMap</a:t>
-            </a:r>
-            <a:endParaRPr b="0" lang="fr-FR" sz="2200" spc="-1" strike="noStrike">
-              <a:latin typeface="Arial"/>
-            </a:endParaRPr>
-          </a:p>
-        </p:txBody>
-      </p:sp>
-      <p:sp>
-        <p:nvSpPr>
-          <p:cNvPr id="155" name="CustomShape 36"/>
-          <p:cNvSpPr/>
-          <p:nvPr/>
-        </p:nvSpPr>
-        <p:spPr>
-          <a:xfrm>
-            <a:off x="5464440" y="3060000"/>
-            <a:ext cx="2068560" cy="343080"/>
-          </a:xfrm>
-          <a:prstGeom prst="roundRect">
-            <a:avLst>
-              <a:gd name="adj" fmla="val 100000"/>
-            </a:avLst>
-          </a:prstGeom>
-          <a:solidFill>
-            <a:srgbClr val="ff8000"/>
-          </a:solidFill>
-          <a:ln w="12700">
-            <a:noFill/>
-          </a:ln>
-        </p:spPr>
-        <p:style>
-          <a:lnRef idx="2">
-            <a:schemeClr val="accent1">
-              <a:shade val="50000"/>
-            </a:schemeClr>
-          </a:lnRef>
-          <a:fillRef idx="1">
-            <a:schemeClr val="accent1"/>
-          </a:fillRef>
-          <a:effectRef idx="0">
-            <a:schemeClr val="accent1"/>
-          </a:effectRef>
-          <a:fontRef idx="minor"/>
-        </p:style>
-        <p:txBody>
-          <a:bodyPr lIns="90000" rIns="90000" tIns="45000" bIns="45000">
-            <a:noAutofit/>
-          </a:bodyPr>
-          <a:p>
-            <a:pPr algn="ctr">
-              <a:lnSpc>
-                <a:spcPct val="100000"/>
-              </a:lnSpc>
-            </a:pPr>
-            <a:r>
-              <a:rPr b="1" lang="fr-FR" sz="1100" spc="-1" strike="noStrike">
-                <a:solidFill>
-                  <a:srgbClr val="ffffff"/>
-                </a:solidFill>
-                <a:latin typeface="Arial"/>
-                <a:ea typeface="DejaVu Sans"/>
-              </a:rPr>
-              <a:t>Domaine Production</a:t>
-            </a:r>
-            <a:endParaRPr b="0" lang="fr-FR" sz="1100" spc="-1" strike="noStrike">
-              <a:latin typeface="Arial"/>
-            </a:endParaRPr>
-          </a:p>
-        </p:txBody>
-      </p:sp>
-      <p:sp>
-        <p:nvSpPr>
-          <p:cNvPr id="156" name="CustomShape 37"/>
-          <p:cNvSpPr/>
-          <p:nvPr/>
-        </p:nvSpPr>
-        <p:spPr>
-          <a:xfrm>
-            <a:off x="1980000" y="3960000"/>
-            <a:ext cx="1399320" cy="359640"/>
-          </a:xfrm>
-          <a:prstGeom prst="roundRect">
-            <a:avLst>
-              <a:gd name="adj" fmla="val 100000"/>
-            </a:avLst>
-          </a:prstGeom>
-          <a:solidFill>
-            <a:schemeClr val="accent5"/>
-          </a:solidFill>
-          <a:ln w="12700">
-            <a:noFill/>
-          </a:ln>
-        </p:spPr>
-        <p:style>
-          <a:lnRef idx="2">
-            <a:schemeClr val="accent1">
-              <a:shade val="50000"/>
-            </a:schemeClr>
-          </a:lnRef>
-          <a:fillRef idx="1">
-            <a:schemeClr val="accent1"/>
-          </a:fillRef>
-          <a:effectRef idx="0">
-            <a:schemeClr val="accent1"/>
-          </a:effectRef>
-          <a:fontRef idx="minor"/>
-        </p:style>
-        <p:txBody>
-          <a:bodyPr lIns="90000" rIns="90000" tIns="45000" bIns="45000">
-            <a:noAutofit/>
-          </a:bodyPr>
-          <a:p>
-            <a:pPr algn="ctr">
-              <a:lnSpc>
-                <a:spcPct val="100000"/>
-              </a:lnSpc>
-            </a:pPr>
-            <a:r>
-              <a:rPr b="1" lang="fr-FR" sz="800" spc="-1" strike="noStrike">
-                <a:solidFill>
-                  <a:srgbClr val="ffffff"/>
-                </a:solidFill>
-                <a:latin typeface="Arial"/>
-                <a:ea typeface="DejaVu Sans"/>
-              </a:rPr>
-              <a:t>Creation de l’appli de reservation</a:t>
-            </a:r>
-            <a:endParaRPr b="0" lang="fr-FR" sz="800" spc="-1" strike="noStrike">
-              <a:latin typeface="Arial"/>
-            </a:endParaRPr>
-          </a:p>
-        </p:txBody>
-      </p:sp>
-      <p:sp>
-        <p:nvSpPr>
-          <p:cNvPr id="157" name="CustomShape 38"/>
-          <p:cNvSpPr/>
-          <p:nvPr/>
-        </p:nvSpPr>
-        <p:spPr>
-          <a:xfrm>
-            <a:off x="1440000" y="3420000"/>
-            <a:ext cx="1259640" cy="539640"/>
-          </a:xfrm>
-          <a:prstGeom prst="roundRect">
-            <a:avLst>
-              <a:gd name="adj" fmla="val 100000"/>
-            </a:avLst>
-          </a:prstGeom>
-          <a:solidFill>
-            <a:schemeClr val="accent5"/>
-          </a:solidFill>
-          <a:ln w="12700">
-            <a:noFill/>
-          </a:ln>
-        </p:spPr>
-        <p:style>
-          <a:lnRef idx="2">
-            <a:schemeClr val="accent1">
-              <a:shade val="50000"/>
-            </a:schemeClr>
-          </a:lnRef>
-          <a:fillRef idx="1">
-            <a:schemeClr val="accent1"/>
-          </a:fillRef>
-          <a:effectRef idx="0">
-            <a:schemeClr val="accent1"/>
-          </a:effectRef>
-          <a:fontRef idx="minor"/>
-        </p:style>
-        <p:txBody>
-          <a:bodyPr lIns="90000" rIns="90000" tIns="45000" bIns="45000">
-            <a:noAutofit/>
-          </a:bodyPr>
-          <a:p>
-            <a:pPr algn="ctr">
-              <a:lnSpc>
-                <a:spcPct val="100000"/>
-              </a:lnSpc>
-            </a:pPr>
-            <a:r>
-              <a:rPr b="1" lang="fr-FR" sz="800" spc="-1" strike="noStrike">
-                <a:solidFill>
-                  <a:srgbClr val="ffffff"/>
-                </a:solidFill>
-                <a:latin typeface="Arial"/>
-                <a:ea typeface="DejaVu Sans"/>
-              </a:rPr>
-              <a:t>Migration des données vers ORACLE</a:t>
-            </a:r>
-            <a:endParaRPr b="0" lang="fr-FR" sz="800" spc="-1" strike="noStrike">
-              <a:latin typeface="Arial"/>
-            </a:endParaRPr>
-          </a:p>
-        </p:txBody>
-      </p:sp>
-      <p:sp>
-        <p:nvSpPr>
-          <p:cNvPr id="158" name="CustomShape 39"/>
-          <p:cNvSpPr/>
-          <p:nvPr/>
-        </p:nvSpPr>
-        <p:spPr>
-          <a:xfrm>
-            <a:off x="4500000" y="3960000"/>
-            <a:ext cx="1619640" cy="359640"/>
-          </a:xfrm>
-          <a:prstGeom prst="roundRect">
-            <a:avLst>
-              <a:gd name="adj" fmla="val 100000"/>
-            </a:avLst>
-          </a:prstGeom>
-          <a:solidFill>
-            <a:schemeClr val="accent5"/>
-          </a:solidFill>
-          <a:ln w="12700">
-            <a:noFill/>
-          </a:ln>
-        </p:spPr>
-        <p:style>
-          <a:lnRef idx="2">
-            <a:schemeClr val="accent1">
-              <a:shade val="50000"/>
-            </a:schemeClr>
-          </a:lnRef>
-          <a:fillRef idx="1">
-            <a:schemeClr val="accent1"/>
-          </a:fillRef>
-          <a:effectRef idx="0">
-            <a:schemeClr val="accent1"/>
-          </a:effectRef>
-          <a:fontRef idx="minor"/>
-        </p:style>
-        <p:txBody>
-          <a:bodyPr lIns="90000" rIns="90000" tIns="45000" bIns="45000">
-            <a:noAutofit/>
-          </a:bodyPr>
-          <a:p>
-            <a:pPr algn="ctr">
-              <a:lnSpc>
-                <a:spcPct val="100000"/>
-              </a:lnSpc>
-            </a:pPr>
-            <a:r>
-              <a:rPr b="1" lang="fr-FR" sz="800" spc="-1" strike="noStrike">
-                <a:solidFill>
-                  <a:srgbClr val="ffffff"/>
-                </a:solidFill>
-                <a:latin typeface="Arial"/>
-                <a:ea typeface="DejaVu Sans"/>
-              </a:rPr>
-              <a:t>Appel API vers Gestion des Ressources</a:t>
-            </a:r>
-            <a:endParaRPr b="0" lang="fr-FR" sz="800" spc="-1" strike="noStrike">
-              <a:latin typeface="Arial"/>
-            </a:endParaRPr>
-          </a:p>
-        </p:txBody>
-      </p:sp>
-      <p:sp>
-        <p:nvSpPr>
-          <p:cNvPr id="159" name="CustomShape 40"/>
-          <p:cNvSpPr/>
-          <p:nvPr/>
-        </p:nvSpPr>
-        <p:spPr>
-          <a:xfrm>
-            <a:off x="3240000" y="3420000"/>
-            <a:ext cx="1079640" cy="539640"/>
-          </a:xfrm>
-          <a:prstGeom prst="roundRect">
-            <a:avLst>
-              <a:gd name="adj" fmla="val 100000"/>
-            </a:avLst>
-          </a:prstGeom>
-          <a:solidFill>
-            <a:srgbClr val="81955b"/>
-          </a:solidFill>
-          <a:ln w="12700">
-            <a:noFill/>
-          </a:ln>
-        </p:spPr>
-        <p:style>
-          <a:lnRef idx="2">
-            <a:schemeClr val="accent1">
-              <a:shade val="50000"/>
-            </a:schemeClr>
-          </a:lnRef>
-          <a:fillRef idx="1">
-            <a:schemeClr val="accent1"/>
-          </a:fillRef>
-          <a:effectRef idx="0">
-            <a:schemeClr val="accent1"/>
-          </a:effectRef>
-          <a:fontRef idx="minor"/>
-        </p:style>
-        <p:txBody>
-          <a:bodyPr lIns="90000" rIns="90000" tIns="45000" bIns="45000">
-            <a:noAutofit/>
-          </a:bodyPr>
-          <a:p>
-            <a:pPr algn="ctr">
-              <a:lnSpc>
-                <a:spcPct val="100000"/>
-              </a:lnSpc>
-            </a:pPr>
-            <a:r>
-              <a:rPr b="1" lang="fr-FR" sz="800" spc="-1" strike="noStrike">
-                <a:solidFill>
-                  <a:srgbClr val="ffffff"/>
-                </a:solidFill>
-                <a:latin typeface="Arial"/>
-                <a:ea typeface="DejaVu Sans"/>
-              </a:rPr>
-              <a:t>Nouvelle base de données Stocks</a:t>
-            </a:r>
-            <a:endParaRPr b="0" lang="fr-FR" sz="800" spc="-1" strike="noStrike">
-              <a:latin typeface="Arial"/>
-            </a:endParaRPr>
-          </a:p>
-        </p:txBody>
-      </p:sp>
-      <p:sp>
-        <p:nvSpPr>
-          <p:cNvPr id="160" name="CustomShape 41"/>
-          <p:cNvSpPr/>
-          <p:nvPr/>
-        </p:nvSpPr>
-        <p:spPr>
-          <a:xfrm>
-            <a:off x="4385160" y="3600000"/>
-            <a:ext cx="1194480" cy="359640"/>
-          </a:xfrm>
-          <a:prstGeom prst="roundRect">
-            <a:avLst>
-              <a:gd name="adj" fmla="val 100000"/>
-            </a:avLst>
-          </a:prstGeom>
-          <a:solidFill>
-            <a:srgbClr val="81955b"/>
-          </a:solidFill>
-          <a:ln w="12700">
-            <a:noFill/>
-          </a:ln>
-        </p:spPr>
-        <p:style>
-          <a:lnRef idx="2">
-            <a:schemeClr val="accent1">
-              <a:shade val="50000"/>
-            </a:schemeClr>
-          </a:lnRef>
-          <a:fillRef idx="1">
-            <a:schemeClr val="accent1"/>
-          </a:fillRef>
-          <a:effectRef idx="0">
-            <a:schemeClr val="accent1"/>
-          </a:effectRef>
-          <a:fontRef idx="minor"/>
-        </p:style>
-        <p:txBody>
-          <a:bodyPr lIns="90000" rIns="90000" tIns="45000" bIns="45000">
-            <a:noAutofit/>
-          </a:bodyPr>
-          <a:p>
-            <a:pPr algn="ctr">
-              <a:lnSpc>
-                <a:spcPct val="100000"/>
-              </a:lnSpc>
-            </a:pPr>
-            <a:r>
-              <a:rPr b="1" lang="fr-FR" sz="800" spc="-1" strike="noStrike">
-                <a:solidFill>
-                  <a:srgbClr val="ffffff"/>
-                </a:solidFill>
-                <a:latin typeface="Arial"/>
-                <a:ea typeface="DejaVu Sans"/>
-              </a:rPr>
-              <a:t>Appli de Gestion des Stocks</a:t>
-            </a:r>
-            <a:endParaRPr b="0" lang="fr-FR" sz="800" spc="-1" strike="noStrike">
-              <a:latin typeface="Arial"/>
-            </a:endParaRPr>
-          </a:p>
-        </p:txBody>
-      </p:sp>
-      <p:sp>
-        <p:nvSpPr>
-          <p:cNvPr id="161" name="CustomShape 42"/>
-          <p:cNvSpPr/>
-          <p:nvPr/>
-        </p:nvSpPr>
-        <p:spPr>
-          <a:xfrm>
-            <a:off x="3647880" y="5760000"/>
-            <a:ext cx="4091760" cy="359640"/>
-          </a:xfrm>
-          <a:prstGeom prst="roundRect">
-            <a:avLst>
-              <a:gd name="adj" fmla="val 100000"/>
-            </a:avLst>
-          </a:prstGeom>
-          <a:solidFill>
-            <a:srgbClr val="618197"/>
-          </a:solidFill>
-          <a:ln w="12700">
-            <a:noFill/>
-          </a:ln>
-        </p:spPr>
-        <p:style>
-          <a:lnRef idx="2">
-            <a:schemeClr val="accent1">
-              <a:shade val="50000"/>
-            </a:schemeClr>
-          </a:lnRef>
-          <a:fillRef idx="1">
-            <a:schemeClr val="accent1"/>
-          </a:fillRef>
-          <a:effectRef idx="0">
-            <a:schemeClr val="accent1"/>
-          </a:effectRef>
-          <a:fontRef idx="minor"/>
-        </p:style>
-        <p:txBody>
-          <a:bodyPr lIns="90000" rIns="90000" tIns="45000" bIns="45000">
-            <a:noAutofit/>
-          </a:bodyPr>
-          <a:p>
-            <a:pPr algn="ctr">
-              <a:lnSpc>
-                <a:spcPct val="100000"/>
-              </a:lnSpc>
-            </a:pPr>
-            <a:r>
-              <a:rPr b="1" lang="fr-FR" sz="1200" spc="-1" strike="noStrike">
-                <a:solidFill>
-                  <a:srgbClr val="ffffff"/>
-                </a:solidFill>
-                <a:latin typeface="Arial"/>
-                <a:ea typeface="DejaVu Sans"/>
-              </a:rPr>
-              <a:t>Entrée/Sortie des pieces avec lecture du code barre</a:t>
-            </a:r>
-            <a:endParaRPr b="0" lang="fr-FR" sz="1200" spc="-1" strike="noStrike">
-              <a:latin typeface="Arial"/>
-            </a:endParaRPr>
-          </a:p>
-        </p:txBody>
-      </p:sp>
-      <p:sp>
-        <p:nvSpPr>
-          <p:cNvPr id="162" name="CustomShape 43"/>
-          <p:cNvSpPr/>
-          <p:nvPr/>
-        </p:nvSpPr>
-        <p:spPr>
-          <a:xfrm>
-            <a:off x="8344440" y="2880000"/>
-            <a:ext cx="3355200" cy="343080"/>
-          </a:xfrm>
-          <a:prstGeom prst="roundRect">
-            <a:avLst>
-              <a:gd name="adj" fmla="val 100000"/>
-            </a:avLst>
-          </a:prstGeom>
-          <a:solidFill>
-            <a:srgbClr val="ff8000"/>
-          </a:solidFill>
-          <a:ln w="12700">
-            <a:noFill/>
-          </a:ln>
-        </p:spPr>
-        <p:style>
-          <a:lnRef idx="2">
-            <a:schemeClr val="accent1">
-              <a:shade val="50000"/>
-            </a:schemeClr>
-          </a:lnRef>
-          <a:fillRef idx="1">
-            <a:schemeClr val="accent1"/>
-          </a:fillRef>
-          <a:effectRef idx="0">
-            <a:schemeClr val="accent1"/>
-          </a:effectRef>
-          <a:fontRef idx="minor"/>
-        </p:style>
-        <p:txBody>
-          <a:bodyPr lIns="90000" rIns="90000" tIns="45000" bIns="45000">
-            <a:noAutofit/>
-          </a:bodyPr>
-          <a:p>
-            <a:pPr algn="ctr">
-              <a:lnSpc>
-                <a:spcPct val="100000"/>
-              </a:lnSpc>
-            </a:pPr>
-            <a:r>
-              <a:rPr b="1" lang="fr-FR" sz="1100" spc="-1" strike="noStrike">
-                <a:solidFill>
-                  <a:srgbClr val="ffffff"/>
-                </a:solidFill>
-                <a:latin typeface="Arial"/>
-                <a:ea typeface="DejaVu Sans"/>
-              </a:rPr>
-              <a:t>Domaine Production</a:t>
-            </a:r>
-            <a:endParaRPr b="0" lang="fr-FR" sz="1100" spc="-1" strike="noStrike">
-              <a:latin typeface="Arial"/>
-            </a:endParaRPr>
-          </a:p>
-        </p:txBody>
-      </p:sp>
-      <p:sp>
-        <p:nvSpPr>
-          <p:cNvPr id="163" name="CustomShape 44"/>
-          <p:cNvSpPr/>
-          <p:nvPr/>
-        </p:nvSpPr>
-        <p:spPr>
-          <a:xfrm>
-            <a:off x="5580000" y="3600000"/>
-            <a:ext cx="1439640" cy="359640"/>
-          </a:xfrm>
-          <a:prstGeom prst="roundRect">
-            <a:avLst>
-              <a:gd name="adj" fmla="val 100000"/>
-            </a:avLst>
-          </a:prstGeom>
-          <a:solidFill>
-            <a:srgbClr val="81955b"/>
-          </a:solidFill>
-          <a:ln w="12700">
-            <a:noFill/>
-          </a:ln>
-        </p:spPr>
-        <p:style>
-          <a:lnRef idx="2">
-            <a:schemeClr val="accent1">
-              <a:shade val="50000"/>
-            </a:schemeClr>
-          </a:lnRef>
-          <a:fillRef idx="1">
-            <a:schemeClr val="accent1"/>
-          </a:fillRef>
-          <a:effectRef idx="0">
-            <a:schemeClr val="accent1"/>
-          </a:effectRef>
-          <a:fontRef idx="minor"/>
-        </p:style>
-        <p:txBody>
-          <a:bodyPr lIns="90000" rIns="90000" tIns="45000" bIns="45000">
-            <a:noAutofit/>
-          </a:bodyPr>
-          <a:p>
-            <a:pPr algn="ctr">
-              <a:lnSpc>
-                <a:spcPct val="100000"/>
-              </a:lnSpc>
-            </a:pPr>
-            <a:r>
-              <a:rPr b="1" lang="fr-FR" sz="800" spc="-1" strike="noStrike">
-                <a:solidFill>
-                  <a:srgbClr val="ffffff"/>
-                </a:solidFill>
-                <a:latin typeface="Arial"/>
-                <a:ea typeface="DejaVu Sans"/>
-              </a:rPr>
-              <a:t>Tableau de bord/ Alerte sms email</a:t>
-            </a:r>
-            <a:endParaRPr b="0" lang="fr-FR" sz="800" spc="-1" strike="noStrike">
-              <a:latin typeface="Arial"/>
-            </a:endParaRPr>
-          </a:p>
-        </p:txBody>
-      </p:sp>
-      <p:sp>
-        <p:nvSpPr>
-          <p:cNvPr id="164" name="CustomShape 45"/>
-          <p:cNvSpPr/>
-          <p:nvPr/>
-        </p:nvSpPr>
-        <p:spPr>
-          <a:xfrm>
-            <a:off x="3665160" y="4677120"/>
-            <a:ext cx="1194480" cy="179640"/>
-          </a:xfrm>
-          <a:prstGeom prst="roundRect">
-            <a:avLst>
-              <a:gd name="adj" fmla="val 100000"/>
-            </a:avLst>
-          </a:prstGeom>
-          <a:solidFill>
-            <a:srgbClr val="81955b"/>
-          </a:solidFill>
-          <a:ln w="12700">
-            <a:noFill/>
-          </a:ln>
-        </p:spPr>
-        <p:style>
-          <a:lnRef idx="2">
-            <a:schemeClr val="accent1">
-              <a:shade val="50000"/>
-            </a:schemeClr>
-          </a:lnRef>
-          <a:fillRef idx="1">
-            <a:schemeClr val="accent1"/>
-          </a:fillRef>
-          <a:effectRef idx="0">
-            <a:schemeClr val="accent1"/>
-          </a:effectRef>
-          <a:fontRef idx="minor"/>
-        </p:style>
-        <p:txBody>
-          <a:bodyPr lIns="90000" rIns="90000" tIns="45000" bIns="45000">
-            <a:noAutofit/>
-          </a:bodyPr>
-          <a:p>
-            <a:pPr algn="ctr">
-              <a:lnSpc>
-                <a:spcPct val="100000"/>
-              </a:lnSpc>
-            </a:pPr>
-            <a:r>
-              <a:rPr b="1" lang="fr-FR" sz="800" spc="-1" strike="noStrike">
-                <a:solidFill>
-                  <a:srgbClr val="ffffff"/>
-                </a:solidFill>
-                <a:latin typeface="Arial"/>
-                <a:ea typeface="DejaVu Sans"/>
-              </a:rPr>
-              <a:t>Appli Fournisseurs</a:t>
-            </a:r>
-            <a:endParaRPr b="0" lang="fr-FR" sz="800" spc="-1" strike="noStrike">
-              <a:latin typeface="Arial"/>
-            </a:endParaRPr>
-          </a:p>
-        </p:txBody>
-      </p:sp>
-      <p:sp>
-        <p:nvSpPr>
-          <p:cNvPr id="165" name="CustomShape 46"/>
-          <p:cNvSpPr/>
-          <p:nvPr/>
-        </p:nvSpPr>
-        <p:spPr>
-          <a:xfrm>
-            <a:off x="4680000" y="6152400"/>
-            <a:ext cx="3059640" cy="359640"/>
-          </a:xfrm>
-          <a:prstGeom prst="roundRect">
-            <a:avLst>
-              <a:gd name="adj" fmla="val 100000"/>
-            </a:avLst>
-          </a:prstGeom>
-          <a:solidFill>
-            <a:srgbClr val="618197"/>
-          </a:solidFill>
-          <a:ln w="12700">
-            <a:noFill/>
-          </a:ln>
-        </p:spPr>
-        <p:style>
-          <a:lnRef idx="2">
-            <a:schemeClr val="accent1">
-              <a:shade val="50000"/>
-            </a:schemeClr>
-          </a:lnRef>
-          <a:fillRef idx="1">
-            <a:schemeClr val="accent1"/>
-          </a:fillRef>
-          <a:effectRef idx="0">
-            <a:schemeClr val="accent1"/>
-          </a:effectRef>
-          <a:fontRef idx="minor"/>
-        </p:style>
-        <p:txBody>
-          <a:bodyPr lIns="90000" rIns="90000" tIns="45000" bIns="45000">
-            <a:noAutofit/>
-          </a:bodyPr>
-          <a:p>
-            <a:pPr algn="ctr">
-              <a:lnSpc>
-                <a:spcPct val="100000"/>
-              </a:lnSpc>
-            </a:pPr>
-            <a:r>
-              <a:rPr b="1" lang="fr-FR" sz="1200" spc="-1" strike="noStrike">
-                <a:solidFill>
-                  <a:srgbClr val="ffffff"/>
-                </a:solidFill>
-                <a:latin typeface="Arial"/>
-                <a:ea typeface="DejaVu Sans"/>
-              </a:rPr>
-              <a:t>Suivi en temps réel des livraisons</a:t>
-            </a:r>
-            <a:endParaRPr b="0" lang="fr-FR" sz="1200" spc="-1" strike="noStrike">
-              <a:latin typeface="Arial"/>
-            </a:endParaRPr>
-          </a:p>
-        </p:txBody>
-      </p:sp>
-      <p:sp>
-        <p:nvSpPr>
-          <p:cNvPr id="166" name="CustomShape 47"/>
-          <p:cNvSpPr/>
-          <p:nvPr/>
-        </p:nvSpPr>
-        <p:spPr>
-          <a:xfrm>
-            <a:off x="5040000" y="4680000"/>
-            <a:ext cx="2339640" cy="179640"/>
-          </a:xfrm>
-          <a:prstGeom prst="roundRect">
-            <a:avLst>
-              <a:gd name="adj" fmla="val 100000"/>
-            </a:avLst>
-          </a:prstGeom>
-          <a:solidFill>
-            <a:srgbClr val="81955b"/>
-          </a:solidFill>
-          <a:ln w="12700">
-            <a:noFill/>
-          </a:ln>
-        </p:spPr>
-        <p:style>
-          <a:lnRef idx="2">
-            <a:schemeClr val="accent1">
-              <a:shade val="50000"/>
-            </a:schemeClr>
-          </a:lnRef>
-          <a:fillRef idx="1">
-            <a:schemeClr val="accent1"/>
-          </a:fillRef>
-          <a:effectRef idx="0">
-            <a:schemeClr val="accent1"/>
-          </a:effectRef>
-          <a:fontRef idx="minor"/>
-        </p:style>
-        <p:txBody>
-          <a:bodyPr lIns="90000" rIns="90000" tIns="45000" bIns="45000">
-            <a:noAutofit/>
-          </a:bodyPr>
-          <a:p>
-            <a:pPr algn="ctr">
-              <a:lnSpc>
-                <a:spcPct val="100000"/>
-              </a:lnSpc>
-            </a:pPr>
-            <a:r>
-              <a:rPr b="1" lang="fr-FR" sz="800" spc="-1" strike="noStrike">
-                <a:solidFill>
-                  <a:srgbClr val="ffffff"/>
-                </a:solidFill>
-                <a:latin typeface="Arial"/>
-                <a:ea typeface="DejaVu Sans"/>
-              </a:rPr>
-              <a:t>Connexion HTTPS vers la banque</a:t>
-            </a:r>
-            <a:endParaRPr b="0" lang="fr-FR" sz="800" spc="-1" strike="noStrike">
-              <a:latin typeface="Arial"/>
-            </a:endParaRPr>
-          </a:p>
-        </p:txBody>
-      </p:sp>
-      <p:sp>
-        <p:nvSpPr>
-          <p:cNvPr id="167" name="CustomShape 48"/>
-          <p:cNvSpPr/>
-          <p:nvPr/>
-        </p:nvSpPr>
-        <p:spPr>
-          <a:xfrm>
-            <a:off x="7084440" y="3976560"/>
-            <a:ext cx="3355200" cy="343080"/>
-          </a:xfrm>
-          <a:prstGeom prst="roundRect">
-            <a:avLst>
-              <a:gd name="adj" fmla="val 100000"/>
-            </a:avLst>
-          </a:prstGeom>
-          <a:solidFill>
-            <a:srgbClr val="ff8000"/>
-          </a:solidFill>
-          <a:ln w="12700">
-            <a:noFill/>
-          </a:ln>
-        </p:spPr>
-        <p:style>
-          <a:lnRef idx="2">
-            <a:schemeClr val="accent1">
-              <a:shade val="50000"/>
-            </a:schemeClr>
-          </a:lnRef>
-          <a:fillRef idx="1">
-            <a:schemeClr val="accent1"/>
-          </a:fillRef>
-          <a:effectRef idx="0">
-            <a:schemeClr val="accent1"/>
-          </a:effectRef>
-          <a:fontRef idx="minor"/>
-        </p:style>
-        <p:txBody>
-          <a:bodyPr lIns="90000" rIns="90000" tIns="45000" bIns="45000">
-            <a:noAutofit/>
-          </a:bodyPr>
-          <a:p>
-            <a:pPr algn="ctr">
-              <a:lnSpc>
-                <a:spcPct val="100000"/>
-              </a:lnSpc>
-            </a:pPr>
-            <a:r>
-              <a:rPr b="1" lang="fr-FR" sz="1100" spc="-1" strike="noStrike">
-                <a:solidFill>
-                  <a:srgbClr val="ffffff"/>
-                </a:solidFill>
-                <a:latin typeface="Arial"/>
-                <a:ea typeface="DejaVu Sans"/>
-              </a:rPr>
-              <a:t>Migration des données vers Oracle</a:t>
-            </a:r>
-            <a:endParaRPr b="0" lang="fr-FR" sz="1100" spc="-1" strike="noStrike">
-              <a:latin typeface="Arial"/>
-            </a:endParaRPr>
-          </a:p>
-        </p:txBody>
-      </p:sp>
-    </p:spTree>
-  </p:cSld>
-  <mc:AlternateContent>
-    <mc:Choice Requires="p14">
-      <p:transition spd="slow" p14:dur="2000"/>
-    </mc:Choice>
-    <mc:Fallback>
-      <p:transition spd="slow"/>
-    </mc:Fallback>
-  </mc:AlternateContent>
-</p:sld>
-</file>
-
-<file path=ppt/slides/slide3.xml><?xml version="1.0" encoding="utf-8"?>
-<p:sld xmlns:a="http://schemas.openxmlformats.org/drawingml/2006/main" xmlns:p="http://schemas.openxmlformats.org/presentationml/2006/main" xmlns:r="http://schemas.openxmlformats.org/officeDocument/2006/relationships" xmlns:p14="http://schemas.microsoft.com/office/powerpoint/2010/main" xmlns:p15="http://schemas.microsoft.com/office/powerpoint/2012/main" xmlns:mc="http://schemas.openxmlformats.org/markup-compatibility/2006">
-  <p:cSld>
-    <p:spTree>
-      <p:nvGrpSpPr>
-        <p:cNvPr id="1" name=""/>
-        <p:cNvGrpSpPr/>
-        <p:nvPr/>
-      </p:nvGrpSpPr>
-      <p:grpSpPr>
-        <a:xfrm>
-          <a:off x="0" y="0"/>
-          <a:ext cx="0" cy="0"/>
-          <a:chOff x="0" y="0"/>
-          <a:chExt cx="0" cy="0"/>
-        </a:xfrm>
-      </p:grpSpPr>
-      <p:sp>
-        <p:nvSpPr>
-          <p:cNvPr id="168" name="CustomShape 1"/>
-          <p:cNvSpPr/>
-          <p:nvPr/>
-        </p:nvSpPr>
-        <p:spPr>
-          <a:xfrm>
-            <a:off x="1261800" y="365760"/>
-            <a:ext cx="9691560" cy="1324440"/>
-          </a:xfrm>
-          <a:prstGeom prst="rect">
-            <a:avLst/>
-          </a:prstGeom>
-          <a:noFill/>
-          <a:ln w="0">
-            <a:noFill/>
-          </a:ln>
-        </p:spPr>
-        <p:style>
-          <a:lnRef idx="0"/>
-          <a:fillRef idx="0"/>
-          <a:effectRef idx="0"/>
-          <a:fontRef idx="minor"/>
-        </p:style>
+            <a:endParaRPr b="0" lang="fr-FR" sz="900" spc="-1" strike="noStrike">
+              <a:latin typeface="Arial"/>
+            </a:endParaRPr>
+          </a:p>
+        </p:txBody>
       </p:sp>
     </p:spTree>
   </p:cSld>

</xml_diff>

<commit_message>
Le 26 Avril 2021
</commit_message>
<xml_diff>
--- a/P4_02_Roadmap_RepAero.pptx
+++ b/P4_02_Roadmap_RepAero.pptx
@@ -53,7 +53,7 @@
       </p:grpSpPr>
       <p:sp>
         <p:nvSpPr>
-          <p:cNvPr id="23" name="PlaceHolder 1"/>
+          <p:cNvPr id="22" name="PlaceHolder 1"/>
           <p:cNvSpPr>
             <a:spLocks noGrp="1"/>
           </p:cNvSpPr>
@@ -64,7 +64,7 @@
         <p:spPr>
           <a:xfrm>
             <a:off x="1261800" y="365760"/>
-            <a:ext cx="9691200" cy="1324080"/>
+            <a:ext cx="9690480" cy="1323360"/>
           </a:xfrm>
           <a:prstGeom prst="rect">
             <a:avLst/>
@@ -84,7 +84,7 @@
       </p:sp>
       <p:sp>
         <p:nvSpPr>
-          <p:cNvPr id="24" name="PlaceHolder 2"/>
+          <p:cNvPr id="23" name="PlaceHolder 2"/>
           <p:cNvSpPr>
             <a:spLocks noGrp="1"/>
           </p:cNvSpPr>
@@ -114,7 +114,7 @@
       </p:sp>
       <p:sp>
         <p:nvSpPr>
-          <p:cNvPr id="25" name="PlaceHolder 3"/>
+          <p:cNvPr id="24" name="PlaceHolder 3"/>
           <p:cNvSpPr>
             <a:spLocks noGrp="1"/>
           </p:cNvSpPr>
@@ -166,7 +166,7 @@
       </p:grpSpPr>
       <p:sp>
         <p:nvSpPr>
-          <p:cNvPr id="26" name="PlaceHolder 1"/>
+          <p:cNvPr id="25" name="PlaceHolder 1"/>
           <p:cNvSpPr>
             <a:spLocks noGrp="1"/>
           </p:cNvSpPr>
@@ -177,7 +177,7 @@
         <p:spPr>
           <a:xfrm>
             <a:off x="1261800" y="365760"/>
-            <a:ext cx="9691200" cy="1324080"/>
+            <a:ext cx="9690480" cy="1323360"/>
           </a:xfrm>
           <a:prstGeom prst="rect">
             <a:avLst/>
@@ -197,7 +197,7 @@
       </p:sp>
       <p:sp>
         <p:nvSpPr>
-          <p:cNvPr id="27" name="PlaceHolder 2"/>
+          <p:cNvPr id="26" name="PlaceHolder 2"/>
           <p:cNvSpPr>
             <a:spLocks noGrp="1"/>
           </p:cNvSpPr>
@@ -227,7 +227,7 @@
       </p:sp>
       <p:sp>
         <p:nvSpPr>
-          <p:cNvPr id="28" name="PlaceHolder 3"/>
+          <p:cNvPr id="27" name="PlaceHolder 3"/>
           <p:cNvSpPr>
             <a:spLocks noGrp="1"/>
           </p:cNvSpPr>
@@ -257,7 +257,7 @@
       </p:sp>
       <p:sp>
         <p:nvSpPr>
-          <p:cNvPr id="29" name="PlaceHolder 4"/>
+          <p:cNvPr id="28" name="PlaceHolder 4"/>
           <p:cNvSpPr>
             <a:spLocks noGrp="1"/>
           </p:cNvSpPr>
@@ -287,7 +287,7 @@
       </p:sp>
       <p:sp>
         <p:nvSpPr>
-          <p:cNvPr id="30" name="PlaceHolder 5"/>
+          <p:cNvPr id="29" name="PlaceHolder 5"/>
           <p:cNvSpPr>
             <a:spLocks noGrp="1"/>
           </p:cNvSpPr>
@@ -339,7 +339,7 @@
       </p:grpSpPr>
       <p:sp>
         <p:nvSpPr>
-          <p:cNvPr id="31" name="PlaceHolder 1"/>
+          <p:cNvPr id="30" name="PlaceHolder 1"/>
           <p:cNvSpPr>
             <a:spLocks noGrp="1"/>
           </p:cNvSpPr>
@@ -350,7 +350,7 @@
         <p:spPr>
           <a:xfrm>
             <a:off x="1261800" y="365760"/>
-            <a:ext cx="9691200" cy="1324080"/>
+            <a:ext cx="9690480" cy="1323360"/>
           </a:xfrm>
           <a:prstGeom prst="rect">
             <a:avLst/>
@@ -370,7 +370,7 @@
       </p:sp>
       <p:sp>
         <p:nvSpPr>
-          <p:cNvPr id="32" name="PlaceHolder 2"/>
+          <p:cNvPr id="31" name="PlaceHolder 2"/>
           <p:cNvSpPr>
             <a:spLocks noGrp="1"/>
           </p:cNvSpPr>
@@ -400,7 +400,7 @@
       </p:sp>
       <p:sp>
         <p:nvSpPr>
-          <p:cNvPr id="33" name="PlaceHolder 3"/>
+          <p:cNvPr id="32" name="PlaceHolder 3"/>
           <p:cNvSpPr>
             <a:spLocks noGrp="1"/>
           </p:cNvSpPr>
@@ -430,7 +430,7 @@
       </p:sp>
       <p:sp>
         <p:nvSpPr>
-          <p:cNvPr id="34" name="PlaceHolder 4"/>
+          <p:cNvPr id="33" name="PlaceHolder 4"/>
           <p:cNvSpPr>
             <a:spLocks noGrp="1"/>
           </p:cNvSpPr>
@@ -460,7 +460,7 @@
       </p:sp>
       <p:sp>
         <p:nvSpPr>
-          <p:cNvPr id="35" name="PlaceHolder 5"/>
+          <p:cNvPr id="34" name="PlaceHolder 5"/>
           <p:cNvSpPr>
             <a:spLocks noGrp="1"/>
           </p:cNvSpPr>
@@ -490,7 +490,7 @@
       </p:sp>
       <p:sp>
         <p:nvSpPr>
-          <p:cNvPr id="36" name="PlaceHolder 6"/>
+          <p:cNvPr id="35" name="PlaceHolder 6"/>
           <p:cNvSpPr>
             <a:spLocks noGrp="1"/>
           </p:cNvSpPr>
@@ -520,7 +520,7 @@
       </p:sp>
       <p:sp>
         <p:nvSpPr>
-          <p:cNvPr id="37" name="PlaceHolder 7"/>
+          <p:cNvPr id="36" name="PlaceHolder 7"/>
           <p:cNvSpPr>
             <a:spLocks noGrp="1"/>
           </p:cNvSpPr>
@@ -572,7 +572,7 @@
       </p:grpSpPr>
       <p:sp>
         <p:nvSpPr>
-          <p:cNvPr id="2" name="PlaceHolder 1"/>
+          <p:cNvPr id="1" name="PlaceHolder 1"/>
           <p:cNvSpPr>
             <a:spLocks noGrp="1"/>
           </p:cNvSpPr>
@@ -583,7 +583,7 @@
         <p:spPr>
           <a:xfrm>
             <a:off x="1261800" y="365760"/>
-            <a:ext cx="9691200" cy="1324080"/>
+            <a:ext cx="9690480" cy="1323360"/>
           </a:xfrm>
           <a:prstGeom prst="rect">
             <a:avLst/>
@@ -603,7 +603,7 @@
       </p:sp>
       <p:sp>
         <p:nvSpPr>
-          <p:cNvPr id="3" name="PlaceHolder 2"/>
+          <p:cNvPr id="2" name="PlaceHolder 2"/>
           <p:cNvSpPr>
             <a:spLocks noGrp="1"/>
           </p:cNvSpPr>
@@ -656,7 +656,7 @@
       </p:grpSpPr>
       <p:sp>
         <p:nvSpPr>
-          <p:cNvPr id="4" name="PlaceHolder 1"/>
+          <p:cNvPr id="3" name="PlaceHolder 1"/>
           <p:cNvSpPr>
             <a:spLocks noGrp="1"/>
           </p:cNvSpPr>
@@ -667,7 +667,7 @@
         <p:spPr>
           <a:xfrm>
             <a:off x="1261800" y="365760"/>
-            <a:ext cx="9691200" cy="1324080"/>
+            <a:ext cx="9690480" cy="1323360"/>
           </a:xfrm>
           <a:prstGeom prst="rect">
             <a:avLst/>
@@ -687,7 +687,7 @@
       </p:sp>
       <p:sp>
         <p:nvSpPr>
-          <p:cNvPr id="5" name="PlaceHolder 2"/>
+          <p:cNvPr id="4" name="PlaceHolder 2"/>
           <p:cNvSpPr>
             <a:spLocks noGrp="1"/>
           </p:cNvSpPr>
@@ -739,7 +739,7 @@
       </p:grpSpPr>
       <p:sp>
         <p:nvSpPr>
-          <p:cNvPr id="6" name="PlaceHolder 1"/>
+          <p:cNvPr id="5" name="PlaceHolder 1"/>
           <p:cNvSpPr>
             <a:spLocks noGrp="1"/>
           </p:cNvSpPr>
@@ -750,7 +750,7 @@
         <p:spPr>
           <a:xfrm>
             <a:off x="1261800" y="365760"/>
-            <a:ext cx="9691200" cy="1324080"/>
+            <a:ext cx="9690480" cy="1323360"/>
           </a:xfrm>
           <a:prstGeom prst="rect">
             <a:avLst/>
@@ -770,7 +770,7 @@
       </p:sp>
       <p:sp>
         <p:nvSpPr>
-          <p:cNvPr id="7" name="PlaceHolder 2"/>
+          <p:cNvPr id="6" name="PlaceHolder 2"/>
           <p:cNvSpPr>
             <a:spLocks noGrp="1"/>
           </p:cNvSpPr>
@@ -800,7 +800,7 @@
       </p:sp>
       <p:sp>
         <p:nvSpPr>
-          <p:cNvPr id="8" name="PlaceHolder 3"/>
+          <p:cNvPr id="7" name="PlaceHolder 3"/>
           <p:cNvSpPr>
             <a:spLocks noGrp="1"/>
           </p:cNvSpPr>
@@ -852,7 +852,7 @@
       </p:grpSpPr>
       <p:sp>
         <p:nvSpPr>
-          <p:cNvPr id="9" name="PlaceHolder 1"/>
+          <p:cNvPr id="8" name="PlaceHolder 1"/>
           <p:cNvSpPr>
             <a:spLocks noGrp="1"/>
           </p:cNvSpPr>
@@ -863,7 +863,7 @@
         <p:spPr>
           <a:xfrm>
             <a:off x="1261800" y="365760"/>
-            <a:ext cx="9691200" cy="1324080"/>
+            <a:ext cx="9690480" cy="1323360"/>
           </a:xfrm>
           <a:prstGeom prst="rect">
             <a:avLst/>
@@ -905,7 +905,7 @@
       </p:grpSpPr>
       <p:sp>
         <p:nvSpPr>
-          <p:cNvPr id="10" name="PlaceHolder 1"/>
+          <p:cNvPr id="9" name="PlaceHolder 1"/>
           <p:cNvSpPr>
             <a:spLocks noGrp="1"/>
           </p:cNvSpPr>
@@ -916,7 +916,7 @@
         <p:spPr>
           <a:xfrm>
             <a:off x="1261800" y="365760"/>
-            <a:ext cx="9691200" cy="6139080"/>
+            <a:ext cx="9690480" cy="6135480"/>
           </a:xfrm>
           <a:prstGeom prst="rect">
             <a:avLst/>
@@ -958,7 +958,7 @@
       </p:grpSpPr>
       <p:sp>
         <p:nvSpPr>
-          <p:cNvPr id="11" name="PlaceHolder 1"/>
+          <p:cNvPr id="10" name="PlaceHolder 1"/>
           <p:cNvSpPr>
             <a:spLocks noGrp="1"/>
           </p:cNvSpPr>
@@ -969,7 +969,7 @@
         <p:spPr>
           <a:xfrm>
             <a:off x="1261800" y="365760"/>
-            <a:ext cx="9691200" cy="1324080"/>
+            <a:ext cx="9690480" cy="1323360"/>
           </a:xfrm>
           <a:prstGeom prst="rect">
             <a:avLst/>
@@ -989,7 +989,7 @@
       </p:sp>
       <p:sp>
         <p:nvSpPr>
-          <p:cNvPr id="12" name="PlaceHolder 2"/>
+          <p:cNvPr id="11" name="PlaceHolder 2"/>
           <p:cNvSpPr>
             <a:spLocks noGrp="1"/>
           </p:cNvSpPr>
@@ -1019,7 +1019,7 @@
       </p:sp>
       <p:sp>
         <p:nvSpPr>
-          <p:cNvPr id="13" name="PlaceHolder 3"/>
+          <p:cNvPr id="12" name="PlaceHolder 3"/>
           <p:cNvSpPr>
             <a:spLocks noGrp="1"/>
           </p:cNvSpPr>
@@ -1049,7 +1049,7 @@
       </p:sp>
       <p:sp>
         <p:nvSpPr>
-          <p:cNvPr id="14" name="PlaceHolder 4"/>
+          <p:cNvPr id="13" name="PlaceHolder 4"/>
           <p:cNvSpPr>
             <a:spLocks noGrp="1"/>
           </p:cNvSpPr>
@@ -1101,7 +1101,7 @@
       </p:grpSpPr>
       <p:sp>
         <p:nvSpPr>
-          <p:cNvPr id="15" name="PlaceHolder 1"/>
+          <p:cNvPr id="14" name="PlaceHolder 1"/>
           <p:cNvSpPr>
             <a:spLocks noGrp="1"/>
           </p:cNvSpPr>
@@ -1112,7 +1112,7 @@
         <p:spPr>
           <a:xfrm>
             <a:off x="1261800" y="365760"/>
-            <a:ext cx="9691200" cy="1324080"/>
+            <a:ext cx="9690480" cy="1323360"/>
           </a:xfrm>
           <a:prstGeom prst="rect">
             <a:avLst/>
@@ -1132,7 +1132,7 @@
       </p:sp>
       <p:sp>
         <p:nvSpPr>
-          <p:cNvPr id="16" name="PlaceHolder 2"/>
+          <p:cNvPr id="15" name="PlaceHolder 2"/>
           <p:cNvSpPr>
             <a:spLocks noGrp="1"/>
           </p:cNvSpPr>
@@ -1162,7 +1162,7 @@
       </p:sp>
       <p:sp>
         <p:nvSpPr>
-          <p:cNvPr id="17" name="PlaceHolder 3"/>
+          <p:cNvPr id="16" name="PlaceHolder 3"/>
           <p:cNvSpPr>
             <a:spLocks noGrp="1"/>
           </p:cNvSpPr>
@@ -1192,7 +1192,7 @@
       </p:sp>
       <p:sp>
         <p:nvSpPr>
-          <p:cNvPr id="18" name="PlaceHolder 4"/>
+          <p:cNvPr id="17" name="PlaceHolder 4"/>
           <p:cNvSpPr>
             <a:spLocks noGrp="1"/>
           </p:cNvSpPr>
@@ -1244,7 +1244,7 @@
       </p:grpSpPr>
       <p:sp>
         <p:nvSpPr>
-          <p:cNvPr id="19" name="PlaceHolder 1"/>
+          <p:cNvPr id="18" name="PlaceHolder 1"/>
           <p:cNvSpPr>
             <a:spLocks noGrp="1"/>
           </p:cNvSpPr>
@@ -1255,7 +1255,7 @@
         <p:spPr>
           <a:xfrm>
             <a:off x="1261800" y="365760"/>
-            <a:ext cx="9691200" cy="1324080"/>
+            <a:ext cx="9690480" cy="1323360"/>
           </a:xfrm>
           <a:prstGeom prst="rect">
             <a:avLst/>
@@ -1275,7 +1275,7 @@
       </p:sp>
       <p:sp>
         <p:nvSpPr>
-          <p:cNvPr id="20" name="PlaceHolder 2"/>
+          <p:cNvPr id="19" name="PlaceHolder 2"/>
           <p:cNvSpPr>
             <a:spLocks noGrp="1"/>
           </p:cNvSpPr>
@@ -1305,7 +1305,7 @@
       </p:sp>
       <p:sp>
         <p:nvSpPr>
-          <p:cNvPr id="21" name="PlaceHolder 3"/>
+          <p:cNvPr id="20" name="PlaceHolder 3"/>
           <p:cNvSpPr>
             <a:spLocks noGrp="1"/>
           </p:cNvSpPr>
@@ -1335,7 +1335,7 @@
       </p:sp>
       <p:sp>
         <p:nvSpPr>
-          <p:cNvPr id="22" name="PlaceHolder 4"/>
+          <p:cNvPr id="21" name="PlaceHolder 4"/>
           <p:cNvSpPr>
             <a:spLocks noGrp="1"/>
           </p:cNvSpPr>
@@ -1405,7 +1405,7 @@
         <p:spPr>
           <a:xfrm>
             <a:off x="1261800" y="365760"/>
-            <a:ext cx="9691200" cy="1324080"/>
+            <a:ext cx="9690480" cy="1323360"/>
           </a:xfrm>
           <a:prstGeom prst="rect">
             <a:avLst/>
@@ -1424,185 +1424,6 @@
               <a:t>Cliquez pour éditer le format du texte-titre</a:t>
             </a:r>
             <a:endParaRPr b="0" lang="fr-FR" sz="1800" spc="-1" strike="noStrike">
-              <a:latin typeface="Arial"/>
-            </a:endParaRPr>
-          </a:p>
-        </p:txBody>
-      </p:sp>
-      <p:sp>
-        <p:nvSpPr>
-          <p:cNvPr id="1" name="PlaceHolder 2"/>
-          <p:cNvSpPr>
-            <a:spLocks noGrp="1"/>
-          </p:cNvSpPr>
-          <p:nvPr>
-            <p:ph type="body"/>
-          </p:nvPr>
-        </p:nvSpPr>
-        <p:spPr>
-          <a:xfrm>
-            <a:off x="609480" y="1604520"/>
-            <a:ext cx="10972440" cy="3977280"/>
-          </a:xfrm>
-          <a:prstGeom prst="rect">
-            <a:avLst/>
-          </a:prstGeom>
-        </p:spPr>
-        <p:txBody>
-          <a:bodyPr lIns="0" rIns="0" tIns="0" bIns="0">
-            <a:normAutofit/>
-          </a:bodyPr>
-          <a:p>
-            <a:pPr marL="432000" indent="-324000">
-              <a:spcBef>
-                <a:spcPts val="1417"/>
-              </a:spcBef>
-              <a:buClr>
-                <a:srgbClr val="000000"/>
-              </a:buClr>
-              <a:buSzPct val="45000"/>
-              <a:buFont typeface="Wingdings" charset="2"/>
-              <a:buChar char=""/>
-            </a:pPr>
-            <a:r>
-              <a:rPr b="0" lang="fr-FR" sz="3200" spc="-1" strike="noStrike">
-                <a:latin typeface="Arial"/>
-              </a:rPr>
-              <a:t>Cliquez pour éditer le format du plan de texte</a:t>
-            </a:r>
-            <a:endParaRPr b="0" lang="fr-FR" sz="3200" spc="-1" strike="noStrike">
-              <a:latin typeface="Arial"/>
-            </a:endParaRPr>
-          </a:p>
-          <a:p>
-            <a:pPr lvl="1" marL="864000" indent="-324000">
-              <a:spcBef>
-                <a:spcPts val="1134"/>
-              </a:spcBef>
-              <a:buClr>
-                <a:srgbClr val="000000"/>
-              </a:buClr>
-              <a:buSzPct val="75000"/>
-              <a:buFont typeface="Symbol" charset="2"/>
-              <a:buChar char=""/>
-            </a:pPr>
-            <a:r>
-              <a:rPr b="0" lang="fr-FR" sz="2800" spc="-1" strike="noStrike">
-                <a:latin typeface="Arial"/>
-              </a:rPr>
-              <a:t>Second niveau de plan</a:t>
-            </a:r>
-            <a:endParaRPr b="0" lang="fr-FR" sz="2800" spc="-1" strike="noStrike">
-              <a:latin typeface="Arial"/>
-            </a:endParaRPr>
-          </a:p>
-          <a:p>
-            <a:pPr lvl="2" marL="1296000" indent="-288000">
-              <a:spcBef>
-                <a:spcPts val="850"/>
-              </a:spcBef>
-              <a:buClr>
-                <a:srgbClr val="000000"/>
-              </a:buClr>
-              <a:buSzPct val="45000"/>
-              <a:buFont typeface="Wingdings" charset="2"/>
-              <a:buChar char=""/>
-            </a:pPr>
-            <a:r>
-              <a:rPr b="0" lang="fr-FR" sz="2400" spc="-1" strike="noStrike">
-                <a:latin typeface="Arial"/>
-              </a:rPr>
-              <a:t>Troisième niveau de plan</a:t>
-            </a:r>
-            <a:endParaRPr b="0" lang="fr-FR" sz="2400" spc="-1" strike="noStrike">
-              <a:latin typeface="Arial"/>
-            </a:endParaRPr>
-          </a:p>
-          <a:p>
-            <a:pPr lvl="3" marL="1728000" indent="-216000">
-              <a:spcBef>
-                <a:spcPts val="567"/>
-              </a:spcBef>
-              <a:buClr>
-                <a:srgbClr val="000000"/>
-              </a:buClr>
-              <a:buSzPct val="75000"/>
-              <a:buFont typeface="Symbol" charset="2"/>
-              <a:buChar char=""/>
-            </a:pPr>
-            <a:r>
-              <a:rPr b="0" lang="fr-FR" sz="2000" spc="-1" strike="noStrike">
-                <a:latin typeface="Arial"/>
-              </a:rPr>
-              <a:t>Quatrième niveau de plan</a:t>
-            </a:r>
-            <a:endParaRPr b="0" lang="fr-FR" sz="2000" spc="-1" strike="noStrike">
-              <a:latin typeface="Arial"/>
-            </a:endParaRPr>
-          </a:p>
-          <a:p>
-            <a:pPr lvl="4" marL="2160000" indent="-216000">
-              <a:spcBef>
-                <a:spcPts val="283"/>
-              </a:spcBef>
-              <a:buClr>
-                <a:srgbClr val="000000"/>
-              </a:buClr>
-              <a:buSzPct val="45000"/>
-              <a:buFont typeface="Wingdings" charset="2"/>
-              <a:buChar char=""/>
-            </a:pPr>
-            <a:r>
-              <a:rPr b="0" lang="fr-FR" sz="2000" spc="-1" strike="noStrike">
-                <a:latin typeface="Arial"/>
-              </a:rPr>
-              <a:t>Cinquième niveau de plan</a:t>
-            </a:r>
-            <a:endParaRPr b="0" lang="fr-FR" sz="2000" spc="-1" strike="noStrike">
-              <a:latin typeface="Arial"/>
-            </a:endParaRPr>
-          </a:p>
-          <a:p>
-            <a:pPr lvl="5" marL="2592000" indent="-216000">
-              <a:spcBef>
-                <a:spcPts val="283"/>
-              </a:spcBef>
-              <a:buClr>
-                <a:srgbClr val="000000"/>
-              </a:buClr>
-              <a:buSzPct val="45000"/>
-              <a:buFont typeface="Wingdings" charset="2"/>
-              <a:buChar char=""/>
-            </a:pPr>
-            <a:r>
-              <a:rPr b="0" lang="fr-FR" sz="2000" spc="-1" strike="noStrike">
-                <a:latin typeface="Arial"/>
-              </a:rPr>
-              <a:t>Sixième niveau de plan</a:t>
-            </a:r>
-            <a:endParaRPr b="0" lang="fr-FR" sz="2000" spc="-1" strike="noStrike">
-              <a:latin typeface="Arial"/>
-            </a:endParaRPr>
-          </a:p>
-          <a:p>
-            <a:pPr lvl="6" marL="3024000" indent="-216000">
-              <a:spcBef>
-                <a:spcPts val="283"/>
-              </a:spcBef>
-              <a:buClr>
-                <a:srgbClr val="000000"/>
-              </a:buClr>
-              <a:buSzPct val="45000"/>
-              <a:buFont typeface="Wingdings" charset="2"/>
-              <a:buChar char=""/>
-            </a:pPr>
-            <a:r>
-              <a:rPr b="0" lang="fr-FR" sz="2000" spc="-1" strike="noStrike">
-                <a:latin typeface="Arial"/>
-              </a:rPr>
-              <a:t>Septième niveau de plan</a:t>
-            </a:r>
-            <a:endParaRPr b="0" lang="fr-FR" sz="2000" spc="-1" strike="noStrike">
               <a:latin typeface="Arial"/>
             </a:endParaRPr>
           </a:p>
@@ -1647,14 +1468,14 @@
       </p:grpSpPr>
       <p:sp>
         <p:nvSpPr>
-          <p:cNvPr id="38" name="CustomShape 1"/>
+          <p:cNvPr id="37" name="CustomShape 1"/>
           <p:cNvSpPr/>
           <p:nvPr/>
         </p:nvSpPr>
         <p:spPr>
           <a:xfrm>
             <a:off x="1259640" y="1800000"/>
-            <a:ext cx="10799640" cy="1618920"/>
+            <a:ext cx="10798920" cy="1618200"/>
           </a:xfrm>
           <a:prstGeom prst="rect">
             <a:avLst/>
@@ -1685,14 +1506,14 @@
       </p:sp>
       <p:sp>
         <p:nvSpPr>
-          <p:cNvPr id="39" name="CustomShape 2"/>
+          <p:cNvPr id="38" name="CustomShape 2"/>
           <p:cNvSpPr/>
           <p:nvPr/>
         </p:nvSpPr>
         <p:spPr>
           <a:xfrm>
             <a:off x="63360" y="4860000"/>
-            <a:ext cx="11995920" cy="617400"/>
+            <a:ext cx="11995200" cy="616680"/>
           </a:xfrm>
           <a:prstGeom prst="rect">
             <a:avLst/>
@@ -1723,14 +1544,14 @@
       </p:sp>
       <p:sp>
         <p:nvSpPr>
-          <p:cNvPr id="40" name="CustomShape 3"/>
+          <p:cNvPr id="39" name="CustomShape 3"/>
           <p:cNvSpPr/>
           <p:nvPr/>
         </p:nvSpPr>
         <p:spPr>
           <a:xfrm>
             <a:off x="63360" y="5580000"/>
-            <a:ext cx="11995920" cy="899280"/>
+            <a:ext cx="11995200" cy="898560"/>
           </a:xfrm>
           <a:prstGeom prst="rect">
             <a:avLst/>
@@ -1761,14 +1582,14 @@
       </p:sp>
       <p:sp>
         <p:nvSpPr>
-          <p:cNvPr id="41" name="CustomShape 4"/>
+          <p:cNvPr id="40" name="CustomShape 4"/>
           <p:cNvSpPr/>
           <p:nvPr/>
         </p:nvSpPr>
         <p:spPr>
           <a:xfrm>
             <a:off x="1260000" y="3419640"/>
-            <a:ext cx="10799280" cy="1436760"/>
+            <a:ext cx="10798560" cy="1436040"/>
           </a:xfrm>
           <a:prstGeom prst="rect">
             <a:avLst/>
@@ -1799,14 +1620,14 @@
       </p:sp>
       <p:sp>
         <p:nvSpPr>
-          <p:cNvPr id="42" name="CustomShape 5"/>
+          <p:cNvPr id="41" name="CustomShape 5"/>
           <p:cNvSpPr/>
           <p:nvPr/>
         </p:nvSpPr>
         <p:spPr>
           <a:xfrm>
             <a:off x="63360" y="1800000"/>
-            <a:ext cx="1195560" cy="1618920"/>
+            <a:ext cx="1194840" cy="1618200"/>
           </a:xfrm>
           <a:prstGeom prst="rect">
             <a:avLst/>
@@ -1837,14 +1658,14 @@
       </p:sp>
       <p:sp>
         <p:nvSpPr>
-          <p:cNvPr id="43" name="CustomShape 6"/>
+          <p:cNvPr id="42" name="CustomShape 6"/>
           <p:cNvSpPr/>
           <p:nvPr/>
         </p:nvSpPr>
         <p:spPr>
           <a:xfrm>
             <a:off x="63360" y="3419640"/>
-            <a:ext cx="1195920" cy="1439640"/>
+            <a:ext cx="1195200" cy="1438920"/>
           </a:xfrm>
           <a:prstGeom prst="rect">
             <a:avLst/>
@@ -1875,14 +1696,14 @@
       </p:sp>
       <p:sp>
         <p:nvSpPr>
-          <p:cNvPr id="44" name="CustomShape 7"/>
+          <p:cNvPr id="43" name="CustomShape 7"/>
           <p:cNvSpPr/>
           <p:nvPr/>
         </p:nvSpPr>
         <p:spPr>
           <a:xfrm>
             <a:off x="63360" y="4860000"/>
-            <a:ext cx="1179720" cy="617400"/>
+            <a:ext cx="1179000" cy="616680"/>
           </a:xfrm>
           <a:prstGeom prst="rect">
             <a:avLst/>
@@ -1913,14 +1734,14 @@
       </p:sp>
       <p:sp>
         <p:nvSpPr>
-          <p:cNvPr id="45" name="CustomShape 8"/>
+          <p:cNvPr id="44" name="CustomShape 8"/>
           <p:cNvSpPr/>
           <p:nvPr/>
         </p:nvSpPr>
         <p:spPr>
           <a:xfrm>
             <a:off x="63360" y="5580000"/>
-            <a:ext cx="1179720" cy="1079280"/>
+            <a:ext cx="1179000" cy="1078560"/>
           </a:xfrm>
           <a:prstGeom prst="rect">
             <a:avLst/>
@@ -1976,7 +1797,7 @@
       </p:sp>
       <p:sp>
         <p:nvSpPr>
-          <p:cNvPr id="46" name="Line 9"/>
+          <p:cNvPr id="45" name="Line 9"/>
           <p:cNvSpPr/>
           <p:nvPr/>
         </p:nvSpPr>
@@ -2011,7 +1832,7 @@
       </p:sp>
       <p:sp>
         <p:nvSpPr>
-          <p:cNvPr id="47" name="Line 10"/>
+          <p:cNvPr id="46" name="Line 10"/>
           <p:cNvSpPr/>
           <p:nvPr/>
         </p:nvSpPr>
@@ -2046,7 +1867,7 @@
       </p:sp>
       <p:sp>
         <p:nvSpPr>
-          <p:cNvPr id="48" name="Line 11"/>
+          <p:cNvPr id="47" name="Line 11"/>
           <p:cNvSpPr/>
           <p:nvPr/>
         </p:nvSpPr>
@@ -2081,7 +1902,7 @@
       </p:sp>
       <p:sp>
         <p:nvSpPr>
-          <p:cNvPr id="49" name="Line 12"/>
+          <p:cNvPr id="48" name="Line 12"/>
           <p:cNvSpPr/>
           <p:nvPr/>
         </p:nvSpPr>
@@ -2116,14 +1937,14 @@
       </p:sp>
       <p:sp>
         <p:nvSpPr>
-          <p:cNvPr id="50" name="CustomShape 13"/>
+          <p:cNvPr id="49" name="CustomShape 13"/>
           <p:cNvSpPr/>
           <p:nvPr/>
         </p:nvSpPr>
         <p:spPr>
           <a:xfrm>
             <a:off x="1440000" y="1800000"/>
-            <a:ext cx="1938960" cy="899280"/>
+            <a:ext cx="1938240" cy="898560"/>
           </a:xfrm>
           <a:prstGeom prst="roundRect">
             <a:avLst>
@@ -2179,14 +2000,14 @@
       </p:sp>
       <p:sp>
         <p:nvSpPr>
-          <p:cNvPr id="51" name="CustomShape 14"/>
+          <p:cNvPr id="50" name="CustomShape 14"/>
           <p:cNvSpPr/>
           <p:nvPr/>
         </p:nvSpPr>
         <p:spPr>
           <a:xfrm>
             <a:off x="3304440" y="2520000"/>
-            <a:ext cx="2151360" cy="334080"/>
+            <a:ext cx="2150640" cy="333360"/>
           </a:xfrm>
           <a:prstGeom prst="roundRect">
             <a:avLst>
@@ -2244,14 +2065,14 @@
       </p:sp>
       <p:sp>
         <p:nvSpPr>
-          <p:cNvPr id="52" name="CustomShape 15"/>
+          <p:cNvPr id="51" name="CustomShape 15"/>
           <p:cNvSpPr/>
           <p:nvPr/>
         </p:nvSpPr>
         <p:spPr>
           <a:xfrm>
             <a:off x="1431360" y="5681880"/>
-            <a:ext cx="1807920" cy="437400"/>
+            <a:ext cx="1807200" cy="436680"/>
           </a:xfrm>
           <a:prstGeom prst="roundRect">
             <a:avLst>
@@ -2307,14 +2128,14 @@
       </p:sp>
       <p:sp>
         <p:nvSpPr>
-          <p:cNvPr id="53" name="CustomShape 16"/>
+          <p:cNvPr id="52" name="CustomShape 16"/>
           <p:cNvSpPr/>
           <p:nvPr/>
         </p:nvSpPr>
         <p:spPr>
           <a:xfrm>
             <a:off x="1980000" y="4320000"/>
-            <a:ext cx="1619280" cy="179280"/>
+            <a:ext cx="1618560" cy="178560"/>
           </a:xfrm>
           <a:prstGeom prst="roundRect">
             <a:avLst>
@@ -2370,14 +2191,14 @@
       </p:sp>
       <p:sp>
         <p:nvSpPr>
-          <p:cNvPr id="54" name="CustomShape 17"/>
+          <p:cNvPr id="53" name="CustomShape 17"/>
           <p:cNvSpPr/>
           <p:nvPr/>
         </p:nvSpPr>
         <p:spPr>
           <a:xfrm>
             <a:off x="1260000" y="1260000"/>
-            <a:ext cx="8099280" cy="453960"/>
+            <a:ext cx="8098560" cy="453240"/>
           </a:xfrm>
           <a:prstGeom prst="roundRect">
             <a:avLst>
@@ -2410,14 +2231,14 @@
       </p:sp>
       <p:sp>
         <p:nvSpPr>
-          <p:cNvPr id="55" name="CustomShape 18"/>
+          <p:cNvPr id="54" name="CustomShape 18"/>
           <p:cNvSpPr/>
           <p:nvPr/>
         </p:nvSpPr>
         <p:spPr>
           <a:xfrm>
             <a:off x="1468440" y="5040000"/>
-            <a:ext cx="150840" cy="176400"/>
+            <a:ext cx="150120" cy="175680"/>
           </a:xfrm>
           <a:prstGeom prst="parallelogram">
             <a:avLst>
@@ -2448,14 +2269,14 @@
       </p:sp>
       <p:sp>
         <p:nvSpPr>
-          <p:cNvPr id="56" name="CustomShape 19"/>
+          <p:cNvPr id="55" name="CustomShape 19"/>
           <p:cNvSpPr/>
           <p:nvPr/>
         </p:nvSpPr>
         <p:spPr>
           <a:xfrm>
             <a:off x="63360" y="2377080"/>
-            <a:ext cx="1179720" cy="489600"/>
+            <a:ext cx="1179000" cy="488880"/>
           </a:xfrm>
           <a:prstGeom prst="rect">
             <a:avLst/>
@@ -2485,14 +2306,14 @@
               </a:tabLst>
             </a:pPr>
             <a:r>
-              <a:rPr b="0" lang="en-US" sz="1200" spc="-1" strike="noStrike">
+              <a:rPr b="0" lang="fr-FR" sz="1200" spc="-1" strike="noStrike">
                 <a:solidFill>
                   <a:srgbClr val="232325"/>
                 </a:solidFill>
                 <a:latin typeface="MV Boli"/>
                 <a:ea typeface="Adobe Heiti Std R"/>
               </a:rPr>
-              <a:t>Etapes clés/ Jalons</a:t>
+              <a:t>Étapes clés/ Jalons</a:t>
             </a:r>
             <a:endParaRPr b="0" lang="fr-FR" sz="1200" spc="-1" strike="noStrike">
               <a:latin typeface="Arial"/>
@@ -2502,14 +2323,14 @@
       </p:sp>
       <p:sp>
         <p:nvSpPr>
-          <p:cNvPr id="57" name="CustomShape 20"/>
+          <p:cNvPr id="56" name="CustomShape 20"/>
           <p:cNvSpPr/>
           <p:nvPr/>
         </p:nvSpPr>
         <p:spPr>
           <a:xfrm>
             <a:off x="63360" y="3631320"/>
-            <a:ext cx="1179720" cy="244080"/>
+            <a:ext cx="1179000" cy="243360"/>
           </a:xfrm>
           <a:prstGeom prst="rect">
             <a:avLst/>
@@ -2539,7 +2360,7 @@
               </a:tabLst>
             </a:pPr>
             <a:r>
-              <a:rPr b="0" lang="en-US" sz="1200" spc="-1" strike="noStrike">
+              <a:rPr b="0" lang="fr-FR" sz="1200" spc="-1" strike="noStrike">
                 <a:solidFill>
                   <a:srgbClr val="232325"/>
                 </a:solidFill>
@@ -2556,14 +2377,14 @@
       </p:sp>
       <p:sp>
         <p:nvSpPr>
-          <p:cNvPr id="58" name="CustomShape 21"/>
+          <p:cNvPr id="57" name="CustomShape 21"/>
           <p:cNvSpPr/>
           <p:nvPr/>
         </p:nvSpPr>
         <p:spPr>
           <a:xfrm>
             <a:off x="0" y="4860000"/>
-            <a:ext cx="1179720" cy="489600"/>
+            <a:ext cx="1179000" cy="488880"/>
           </a:xfrm>
           <a:prstGeom prst="rect">
             <a:avLst/>
@@ -2593,7 +2414,7 @@
               </a:tabLst>
             </a:pPr>
             <a:r>
-              <a:rPr b="0" lang="en-US" sz="1200" spc="-1" strike="noStrike">
+              <a:rPr b="0" lang="fr-FR" sz="1200" spc="-1" strike="noStrike">
                 <a:solidFill>
                   <a:srgbClr val="47313a"/>
                 </a:solidFill>
@@ -2610,14 +2431,14 @@
       </p:sp>
       <p:sp>
         <p:nvSpPr>
-          <p:cNvPr id="59" name="CustomShape 22"/>
+          <p:cNvPr id="58" name="CustomShape 22"/>
           <p:cNvSpPr/>
           <p:nvPr/>
         </p:nvSpPr>
         <p:spPr>
           <a:xfrm>
             <a:off x="63360" y="5307480"/>
-            <a:ext cx="1179720" cy="489600"/>
+            <a:ext cx="1179000" cy="488880"/>
           </a:xfrm>
           <a:prstGeom prst="rect">
             <a:avLst/>
@@ -2636,14 +2457,14 @@
       </p:sp>
       <p:sp>
         <p:nvSpPr>
-          <p:cNvPr id="60" name="CustomShape 23"/>
+          <p:cNvPr id="59" name="CustomShape 23"/>
           <p:cNvSpPr/>
           <p:nvPr/>
         </p:nvSpPr>
         <p:spPr>
           <a:xfrm>
             <a:off x="1433520" y="1397880"/>
-            <a:ext cx="407160" cy="252720"/>
+            <a:ext cx="406440" cy="252000"/>
           </a:xfrm>
           <a:prstGeom prst="rect">
             <a:avLst/>
@@ -2673,7 +2494,7 @@
               </a:tabLst>
             </a:pPr>
             <a:r>
-              <a:rPr b="0" lang="en-US" sz="1400" spc="-32" strike="noStrike">
+              <a:rPr b="0" lang="fr-FR" sz="1400" spc="-32" strike="noStrike">
                 <a:solidFill>
                   <a:srgbClr val="ffffff"/>
                 </a:solidFill>
@@ -2690,14 +2511,14 @@
       </p:sp>
       <p:sp>
         <p:nvSpPr>
-          <p:cNvPr id="61" name="CustomShape 24"/>
+          <p:cNvPr id="60" name="CustomShape 24"/>
           <p:cNvSpPr/>
           <p:nvPr/>
         </p:nvSpPr>
         <p:spPr>
           <a:xfrm>
             <a:off x="3443400" y="1397880"/>
-            <a:ext cx="515880" cy="252720"/>
+            <a:ext cx="515160" cy="252000"/>
           </a:xfrm>
           <a:prstGeom prst="rect">
             <a:avLst/>
@@ -2727,7 +2548,7 @@
               </a:tabLst>
             </a:pPr>
             <a:r>
-              <a:rPr b="0" lang="en-US" sz="1400" spc="-32" strike="noStrike">
+              <a:rPr b="0" lang="fr-FR" sz="1400" spc="-32" strike="noStrike">
                 <a:solidFill>
                   <a:srgbClr val="ffffff"/>
                 </a:solidFill>
@@ -2744,14 +2565,14 @@
       </p:sp>
       <p:sp>
         <p:nvSpPr>
-          <p:cNvPr id="62" name="CustomShape 25"/>
+          <p:cNvPr id="61" name="CustomShape 25"/>
           <p:cNvSpPr/>
           <p:nvPr/>
         </p:nvSpPr>
         <p:spPr>
           <a:xfrm>
             <a:off x="5520240" y="1397880"/>
-            <a:ext cx="550800" cy="252720"/>
+            <a:ext cx="550080" cy="252000"/>
           </a:xfrm>
           <a:prstGeom prst="rect">
             <a:avLst/>
@@ -2781,7 +2602,7 @@
               </a:tabLst>
             </a:pPr>
             <a:r>
-              <a:rPr b="0" lang="en-US" sz="1400" spc="-32" strike="noStrike">
+              <a:rPr b="0" lang="fr-FR" sz="1400" spc="-32" strike="noStrike">
                 <a:solidFill>
                   <a:srgbClr val="ffffff"/>
                 </a:solidFill>
@@ -2798,14 +2619,14 @@
       </p:sp>
       <p:sp>
         <p:nvSpPr>
-          <p:cNvPr id="63" name="CustomShape 26"/>
+          <p:cNvPr id="62" name="CustomShape 26"/>
           <p:cNvSpPr/>
           <p:nvPr/>
         </p:nvSpPr>
         <p:spPr>
           <a:xfrm>
             <a:off x="7597080" y="1397880"/>
-            <a:ext cx="861480" cy="252720"/>
+            <a:ext cx="860760" cy="252000"/>
           </a:xfrm>
           <a:prstGeom prst="rect">
             <a:avLst/>
@@ -2835,7 +2656,7 @@
               </a:tabLst>
             </a:pPr>
             <a:r>
-              <a:rPr b="0" lang="en-US" sz="1400" spc="-32" strike="noStrike">
+              <a:rPr b="0" lang="fr-FR" sz="1400" spc="-32" strike="noStrike">
                 <a:solidFill>
                   <a:srgbClr val="ffffff"/>
                 </a:solidFill>
@@ -2852,14 +2673,14 @@
       </p:sp>
       <p:sp>
         <p:nvSpPr>
-          <p:cNvPr id="64" name="CustomShape 27"/>
+          <p:cNvPr id="63" name="CustomShape 27"/>
           <p:cNvSpPr/>
           <p:nvPr/>
         </p:nvSpPr>
         <p:spPr>
           <a:xfrm>
             <a:off x="8569440" y="2379240"/>
-            <a:ext cx="963720" cy="167040"/>
+            <a:ext cx="963000" cy="166320"/>
           </a:xfrm>
           <a:prstGeom prst="rect">
             <a:avLst/>
@@ -2878,14 +2699,14 @@
       </p:sp>
       <p:sp>
         <p:nvSpPr>
-          <p:cNvPr id="65" name="CustomShape 28"/>
+          <p:cNvPr id="64" name="CustomShape 28"/>
           <p:cNvSpPr/>
           <p:nvPr/>
         </p:nvSpPr>
         <p:spPr>
           <a:xfrm>
             <a:off x="1800000" y="5051880"/>
-            <a:ext cx="1439280" cy="167400"/>
+            <a:ext cx="1438560" cy="166680"/>
           </a:xfrm>
           <a:prstGeom prst="rect">
             <a:avLst/>
@@ -2915,7 +2736,7 @@
               </a:tabLst>
             </a:pPr>
             <a:r>
-              <a:rPr b="0" lang="en-US" sz="1100" spc="-24" strike="noStrike">
+              <a:rPr b="0" lang="fr-FR" sz="1100" spc="-24" strike="noStrike">
                 <a:solidFill>
                   <a:srgbClr val="000000"/>
                 </a:solidFill>
@@ -2932,14 +2753,14 @@
       </p:sp>
       <p:sp>
         <p:nvSpPr>
-          <p:cNvPr id="66" name="CustomShape 29"/>
+          <p:cNvPr id="65" name="CustomShape 29"/>
           <p:cNvSpPr/>
           <p:nvPr/>
         </p:nvSpPr>
         <p:spPr>
           <a:xfrm>
             <a:off x="10847160" y="6295320"/>
-            <a:ext cx="570240" cy="167040"/>
+            <a:ext cx="569520" cy="166320"/>
           </a:xfrm>
           <a:prstGeom prst="rect">
             <a:avLst/>
@@ -2958,14 +2779,14 @@
       </p:sp>
       <p:sp>
         <p:nvSpPr>
-          <p:cNvPr id="67" name="CustomShape 30"/>
+          <p:cNvPr id="66" name="CustomShape 30"/>
           <p:cNvSpPr/>
           <p:nvPr/>
         </p:nvSpPr>
         <p:spPr>
           <a:xfrm>
             <a:off x="9000360" y="5992200"/>
-            <a:ext cx="608040" cy="167040"/>
+            <a:ext cx="607320" cy="166320"/>
           </a:xfrm>
           <a:prstGeom prst="rect">
             <a:avLst/>
@@ -2984,14 +2805,14 @@
       </p:sp>
       <p:sp>
         <p:nvSpPr>
-          <p:cNvPr id="68" name="CustomShape 31"/>
+          <p:cNvPr id="67" name="CustomShape 31"/>
           <p:cNvSpPr/>
           <p:nvPr/>
         </p:nvSpPr>
         <p:spPr>
           <a:xfrm>
             <a:off x="6136200" y="2696760"/>
-            <a:ext cx="1306800" cy="167040"/>
+            <a:ext cx="1306080" cy="166320"/>
           </a:xfrm>
           <a:prstGeom prst="rect">
             <a:avLst/>
@@ -3010,14 +2831,14 @@
       </p:sp>
       <p:sp>
         <p:nvSpPr>
-          <p:cNvPr id="69" name="CustomShape 32"/>
+          <p:cNvPr id="68" name="CustomShape 32"/>
           <p:cNvSpPr/>
           <p:nvPr/>
         </p:nvSpPr>
         <p:spPr>
           <a:xfrm>
             <a:off x="7643520" y="4912920"/>
-            <a:ext cx="570240" cy="203040"/>
+            <a:ext cx="569520" cy="202320"/>
           </a:xfrm>
           <a:prstGeom prst="rect">
             <a:avLst/>
@@ -3047,7 +2868,7 @@
               </a:tabLst>
             </a:pPr>
             <a:r>
-              <a:rPr b="0" lang="en-US" sz="1000" spc="-24" strike="noStrike">
+              <a:rPr b="0" lang="fr-FR" sz="1000" spc="-24" strike="noStrike">
                 <a:solidFill>
                   <a:srgbClr val="ffffff"/>
                 </a:solidFill>
@@ -3064,14 +2885,14 @@
       </p:sp>
       <p:sp>
         <p:nvSpPr>
-          <p:cNvPr id="70" name="CustomShape 33"/>
+          <p:cNvPr id="69" name="CustomShape 33"/>
           <p:cNvSpPr/>
           <p:nvPr/>
         </p:nvSpPr>
         <p:spPr>
           <a:xfrm>
             <a:off x="9300960" y="5595120"/>
-            <a:ext cx="570240" cy="203040"/>
+            <a:ext cx="569520" cy="202320"/>
           </a:xfrm>
           <a:prstGeom prst="rect">
             <a:avLst/>
@@ -3101,7 +2922,7 @@
               </a:tabLst>
             </a:pPr>
             <a:r>
-              <a:rPr b="0" lang="en-US" sz="1000" spc="-24" strike="noStrike">
+              <a:rPr b="0" lang="fr-FR" sz="1000" spc="-24" strike="noStrike">
                 <a:solidFill>
                   <a:srgbClr val="ffffff"/>
                 </a:solidFill>
@@ -3118,14 +2939,14 @@
       </p:sp>
       <p:sp>
         <p:nvSpPr>
-          <p:cNvPr id="71" name="CustomShape 34"/>
+          <p:cNvPr id="70" name="CustomShape 34"/>
           <p:cNvSpPr/>
           <p:nvPr/>
         </p:nvSpPr>
         <p:spPr>
           <a:xfrm>
             <a:off x="7296120" y="5999760"/>
-            <a:ext cx="938520" cy="151920"/>
+            <a:ext cx="937800" cy="151560"/>
           </a:xfrm>
           <a:prstGeom prst="rect">
             <a:avLst/>
@@ -3155,7 +2976,7 @@
               </a:tabLst>
             </a:pPr>
             <a:r>
-              <a:rPr b="0" lang="en-US" sz="1000" spc="-21" strike="noStrike">
+              <a:rPr b="0" lang="fr-FR" sz="1000" spc="-21" strike="noStrike">
                 <a:solidFill>
                   <a:srgbClr val="ffffff"/>
                 </a:solidFill>
@@ -3172,14 +2993,14 @@
       </p:sp>
       <p:sp>
         <p:nvSpPr>
-          <p:cNvPr id="72" name="CustomShape 35"/>
+          <p:cNvPr id="71" name="CustomShape 35"/>
           <p:cNvSpPr/>
           <p:nvPr/>
         </p:nvSpPr>
         <p:spPr>
           <a:xfrm>
             <a:off x="6644520" y="3076200"/>
-            <a:ext cx="1116000" cy="167040"/>
+            <a:ext cx="1115280" cy="166320"/>
           </a:xfrm>
           <a:prstGeom prst="rect">
             <a:avLst/>
@@ -3198,7 +3019,7 @@
       </p:sp>
       <p:sp>
         <p:nvSpPr>
-          <p:cNvPr id="73" name="Line 36"/>
+          <p:cNvPr id="72" name="Line 36"/>
           <p:cNvSpPr/>
           <p:nvPr/>
         </p:nvSpPr>
@@ -3233,7 +3054,7 @@
       </p:sp>
       <p:sp>
         <p:nvSpPr>
-          <p:cNvPr id="74" name="Line 37"/>
+          <p:cNvPr id="73" name="Line 37"/>
           <p:cNvSpPr/>
           <p:nvPr/>
         </p:nvSpPr>
@@ -3268,7 +3089,7 @@
       </p:sp>
       <p:sp>
         <p:nvSpPr>
-          <p:cNvPr id="75" name="Line 38"/>
+          <p:cNvPr id="74" name="Line 38"/>
           <p:cNvSpPr/>
           <p:nvPr/>
         </p:nvSpPr>
@@ -3303,7 +3124,7 @@
       </p:sp>
       <p:sp>
         <p:nvSpPr>
-          <p:cNvPr id="76" name="Line 39"/>
+          <p:cNvPr id="75" name="Line 39"/>
           <p:cNvSpPr/>
           <p:nvPr/>
         </p:nvSpPr>
@@ -3338,14 +3159,14 @@
       </p:sp>
       <p:sp>
         <p:nvSpPr>
-          <p:cNvPr id="77" name="CustomShape 40"/>
+          <p:cNvPr id="76" name="CustomShape 40"/>
           <p:cNvSpPr/>
           <p:nvPr/>
         </p:nvSpPr>
         <p:spPr>
           <a:xfrm>
             <a:off x="3960000" y="360000"/>
-            <a:ext cx="5039280" cy="699120"/>
+            <a:ext cx="5038560" cy="699120"/>
           </a:xfrm>
           <a:prstGeom prst="rect">
             <a:avLst/>
@@ -3372,14 +3193,14 @@
               </a:lnSpc>
             </a:pPr>
             <a:r>
-              <a:rPr b="0" lang="en-GB" sz="4000" spc="-1" strike="noStrike">
+              <a:rPr b="0" lang="fr-FR" sz="4000" spc="-1" strike="noStrike">
                 <a:solidFill>
                   <a:srgbClr val="000000"/>
                 </a:solidFill>
                 <a:latin typeface="Arial"/>
                 <a:ea typeface="DejaVu Sans"/>
               </a:rPr>
-              <a:t>Rep’Aero RoadMap</a:t>
+              <a:t>Rep'Aero Roadmap</a:t>
             </a:r>
             <a:endParaRPr b="0" lang="fr-FR" sz="4000" spc="-1" strike="noStrike">
               <a:latin typeface="Arial"/>
@@ -3389,14 +3210,14 @@
       </p:sp>
       <p:sp>
         <p:nvSpPr>
-          <p:cNvPr id="78" name="CustomShape 41"/>
+          <p:cNvPr id="77" name="CustomShape 41"/>
           <p:cNvSpPr/>
           <p:nvPr/>
         </p:nvSpPr>
         <p:spPr>
           <a:xfrm>
             <a:off x="5464440" y="2912760"/>
-            <a:ext cx="2068200" cy="342720"/>
+            <a:ext cx="2067480" cy="342000"/>
           </a:xfrm>
           <a:prstGeom prst="roundRect">
             <a:avLst>
@@ -3452,14 +3273,14 @@
       </p:sp>
       <p:sp>
         <p:nvSpPr>
-          <p:cNvPr id="79" name="CustomShape 42"/>
+          <p:cNvPr id="78" name="CustomShape 42"/>
           <p:cNvSpPr/>
           <p:nvPr/>
         </p:nvSpPr>
         <p:spPr>
           <a:xfrm>
             <a:off x="1980000" y="3960000"/>
-            <a:ext cx="1398960" cy="359280"/>
+            <a:ext cx="1398240" cy="358560"/>
           </a:xfrm>
           <a:prstGeom prst="roundRect">
             <a:avLst>
@@ -3505,7 +3326,7 @@
                 <a:latin typeface="Arial"/>
                 <a:ea typeface="DejaVu Sans"/>
               </a:rPr>
-              <a:t>Creation de l’appli de reservation</a:t>
+              <a:t>Création de l’appli de réservation</a:t>
             </a:r>
             <a:endParaRPr b="0" lang="fr-FR" sz="800" spc="-1" strike="noStrike">
               <a:latin typeface="Arial"/>
@@ -3515,14 +3336,14 @@
       </p:sp>
       <p:sp>
         <p:nvSpPr>
-          <p:cNvPr id="80" name="CustomShape 43"/>
+          <p:cNvPr id="79" name="CustomShape 43"/>
           <p:cNvSpPr/>
           <p:nvPr/>
         </p:nvSpPr>
         <p:spPr>
           <a:xfrm>
             <a:off x="1440000" y="3420000"/>
-            <a:ext cx="1259280" cy="539280"/>
+            <a:ext cx="1258560" cy="538560"/>
           </a:xfrm>
           <a:prstGeom prst="roundRect">
             <a:avLst>
@@ -3578,14 +3399,14 @@
       </p:sp>
       <p:sp>
         <p:nvSpPr>
-          <p:cNvPr id="81" name="CustomShape 44"/>
+          <p:cNvPr id="80" name="CustomShape 44"/>
           <p:cNvSpPr/>
           <p:nvPr/>
         </p:nvSpPr>
         <p:spPr>
           <a:xfrm>
             <a:off x="3420000" y="3960000"/>
-            <a:ext cx="1619280" cy="359280"/>
+            <a:ext cx="1618560" cy="358560"/>
           </a:xfrm>
           <a:prstGeom prst="roundRect">
             <a:avLst>
@@ -3641,14 +3462,14 @@
       </p:sp>
       <p:sp>
         <p:nvSpPr>
-          <p:cNvPr id="82" name="CustomShape 45"/>
+          <p:cNvPr id="81" name="CustomShape 45"/>
           <p:cNvSpPr/>
           <p:nvPr/>
         </p:nvSpPr>
         <p:spPr>
           <a:xfrm>
             <a:off x="3240000" y="3420000"/>
-            <a:ext cx="1079280" cy="539280"/>
+            <a:ext cx="1078560" cy="538560"/>
           </a:xfrm>
           <a:prstGeom prst="roundRect">
             <a:avLst>
@@ -3704,14 +3525,14 @@
       </p:sp>
       <p:sp>
         <p:nvSpPr>
-          <p:cNvPr id="83" name="CustomShape 46"/>
+          <p:cNvPr id="82" name="CustomShape 46"/>
           <p:cNvSpPr/>
           <p:nvPr/>
         </p:nvSpPr>
         <p:spPr>
           <a:xfrm>
             <a:off x="4385160" y="3600000"/>
-            <a:ext cx="1194120" cy="359280"/>
+            <a:ext cx="1193400" cy="358560"/>
           </a:xfrm>
           <a:prstGeom prst="roundRect">
             <a:avLst>
@@ -3767,14 +3588,14 @@
       </p:sp>
       <p:sp>
         <p:nvSpPr>
-          <p:cNvPr id="84" name="CustomShape 47"/>
+          <p:cNvPr id="83" name="CustomShape 47"/>
           <p:cNvSpPr/>
           <p:nvPr/>
         </p:nvSpPr>
         <p:spPr>
           <a:xfrm>
             <a:off x="3647880" y="5760000"/>
-            <a:ext cx="3371400" cy="359280"/>
+            <a:ext cx="3370680" cy="358560"/>
           </a:xfrm>
           <a:prstGeom prst="roundRect">
             <a:avLst>
@@ -3830,14 +3651,14 @@
       </p:sp>
       <p:sp>
         <p:nvSpPr>
-          <p:cNvPr id="85" name="CustomShape 48"/>
+          <p:cNvPr id="84" name="CustomShape 48"/>
           <p:cNvSpPr/>
           <p:nvPr/>
         </p:nvSpPr>
         <p:spPr>
           <a:xfrm>
             <a:off x="5580000" y="3600000"/>
-            <a:ext cx="1439280" cy="359280"/>
+            <a:ext cx="1438560" cy="358560"/>
           </a:xfrm>
           <a:prstGeom prst="roundRect">
             <a:avLst>
@@ -3893,14 +3714,14 @@
       </p:sp>
       <p:sp>
         <p:nvSpPr>
-          <p:cNvPr id="86" name="CustomShape 49"/>
+          <p:cNvPr id="85" name="CustomShape 49"/>
           <p:cNvSpPr/>
           <p:nvPr/>
         </p:nvSpPr>
         <p:spPr>
           <a:xfrm>
             <a:off x="3600000" y="4500000"/>
-            <a:ext cx="1194120" cy="179280"/>
+            <a:ext cx="1193400" cy="178560"/>
           </a:xfrm>
           <a:prstGeom prst="roundRect">
             <a:avLst>
@@ -3956,14 +3777,14 @@
       </p:sp>
       <p:sp>
         <p:nvSpPr>
-          <p:cNvPr id="87" name="CustomShape 50"/>
+          <p:cNvPr id="86" name="CustomShape 50"/>
           <p:cNvSpPr/>
           <p:nvPr/>
         </p:nvSpPr>
         <p:spPr>
           <a:xfrm>
             <a:off x="3960000" y="6120000"/>
-            <a:ext cx="3059280" cy="359280"/>
+            <a:ext cx="3058560" cy="358560"/>
           </a:xfrm>
           <a:prstGeom prst="roundRect">
             <a:avLst>
@@ -4019,14 +3840,14 @@
       </p:sp>
       <p:sp>
         <p:nvSpPr>
-          <p:cNvPr id="88" name="CustomShape 51"/>
+          <p:cNvPr id="87" name="CustomShape 51"/>
           <p:cNvSpPr/>
           <p:nvPr/>
         </p:nvSpPr>
         <p:spPr>
           <a:xfrm>
             <a:off x="4860000" y="4500000"/>
-            <a:ext cx="2339280" cy="179280"/>
+            <a:ext cx="2338560" cy="178560"/>
           </a:xfrm>
           <a:prstGeom prst="roundRect">
             <a:avLst>
@@ -4082,14 +3903,14 @@
       </p:sp>
       <p:sp>
         <p:nvSpPr>
-          <p:cNvPr id="89" name="CustomShape 52"/>
+          <p:cNvPr id="88" name="CustomShape 52"/>
           <p:cNvSpPr/>
           <p:nvPr/>
         </p:nvSpPr>
         <p:spPr>
           <a:xfrm>
             <a:off x="5580000" y="3976560"/>
-            <a:ext cx="1374840" cy="342720"/>
+            <a:ext cx="1374120" cy="342000"/>
           </a:xfrm>
           <a:prstGeom prst="roundRect">
             <a:avLst>
@@ -4145,14 +3966,14 @@
       </p:sp>
       <p:sp>
         <p:nvSpPr>
-          <p:cNvPr id="90" name="CustomShape 53"/>
+          <p:cNvPr id="89" name="CustomShape 53"/>
           <p:cNvSpPr/>
           <p:nvPr/>
         </p:nvSpPr>
         <p:spPr>
           <a:xfrm>
             <a:off x="3420000" y="2160000"/>
-            <a:ext cx="179280" cy="179280"/>
+            <a:ext cx="178560" cy="178560"/>
           </a:xfrm>
           <a:custGeom>
             <a:avLst/>
@@ -4198,14 +4019,14 @@
       </p:sp>
       <p:sp>
         <p:nvSpPr>
-          <p:cNvPr id="91" name="CustomShape 54"/>
+          <p:cNvPr id="90" name="CustomShape 54"/>
           <p:cNvSpPr/>
           <p:nvPr/>
         </p:nvSpPr>
         <p:spPr>
           <a:xfrm>
             <a:off x="5636520" y="2591280"/>
-            <a:ext cx="719280" cy="272520"/>
+            <a:ext cx="718560" cy="271800"/>
           </a:xfrm>
           <a:prstGeom prst="rect">
             <a:avLst/>
@@ -4249,14 +4070,14 @@
       </p:sp>
       <p:sp>
         <p:nvSpPr>
-          <p:cNvPr id="92" name="CustomShape 55"/>
+          <p:cNvPr id="91" name="CustomShape 55"/>
           <p:cNvSpPr/>
           <p:nvPr/>
         </p:nvSpPr>
         <p:spPr>
           <a:xfrm>
             <a:off x="3600000" y="2160000"/>
-            <a:ext cx="719280" cy="272520"/>
+            <a:ext cx="718560" cy="271800"/>
           </a:xfrm>
           <a:prstGeom prst="rect">
             <a:avLst/>
@@ -4300,14 +4121,14 @@
       </p:sp>
       <p:sp>
         <p:nvSpPr>
-          <p:cNvPr id="93" name="CustomShape 56"/>
+          <p:cNvPr id="92" name="CustomShape 56"/>
           <p:cNvSpPr/>
           <p:nvPr/>
         </p:nvSpPr>
         <p:spPr>
           <a:xfrm>
             <a:off x="7740000" y="2912760"/>
-            <a:ext cx="719280" cy="272520"/>
+            <a:ext cx="718560" cy="271800"/>
           </a:xfrm>
           <a:prstGeom prst="rect">
             <a:avLst/>
@@ -4351,14 +4172,14 @@
       </p:sp>
       <p:sp>
         <p:nvSpPr>
-          <p:cNvPr id="94" name="CustomShape 57"/>
+          <p:cNvPr id="93" name="CustomShape 57"/>
           <p:cNvSpPr/>
           <p:nvPr/>
         </p:nvSpPr>
         <p:spPr>
           <a:xfrm>
             <a:off x="5456520" y="2613240"/>
-            <a:ext cx="179280" cy="179280"/>
+            <a:ext cx="178560" cy="178560"/>
           </a:xfrm>
           <a:custGeom>
             <a:avLst/>
@@ -4404,14 +4225,14 @@
       </p:sp>
       <p:sp>
         <p:nvSpPr>
-          <p:cNvPr id="95" name="CustomShape 58"/>
+          <p:cNvPr id="94" name="CustomShape 58"/>
           <p:cNvSpPr/>
           <p:nvPr/>
         </p:nvSpPr>
         <p:spPr>
           <a:xfrm>
             <a:off x="7581240" y="2912760"/>
-            <a:ext cx="179280" cy="179280"/>
+            <a:ext cx="178560" cy="178560"/>
           </a:xfrm>
           <a:custGeom>
             <a:avLst/>
@@ -4457,14 +4278,14 @@
       </p:sp>
       <p:sp>
         <p:nvSpPr>
-          <p:cNvPr id="96" name="CustomShape 59"/>
+          <p:cNvPr id="95" name="CustomShape 59"/>
           <p:cNvSpPr/>
           <p:nvPr/>
         </p:nvSpPr>
         <p:spPr>
           <a:xfrm>
             <a:off x="3780000" y="1980000"/>
-            <a:ext cx="179280" cy="179280"/>
+            <a:ext cx="178560" cy="178560"/>
           </a:xfrm>
           <a:prstGeom prst="verticalScroll">
             <a:avLst>
@@ -4489,14 +4310,14 @@
       </p:sp>
       <p:sp>
         <p:nvSpPr>
-          <p:cNvPr id="97" name="CustomShape 60"/>
+          <p:cNvPr id="96" name="CustomShape 60"/>
           <p:cNvSpPr/>
           <p:nvPr/>
         </p:nvSpPr>
         <p:spPr>
           <a:xfrm>
             <a:off x="3960000" y="1980000"/>
-            <a:ext cx="719280" cy="272520"/>
+            <a:ext cx="718560" cy="271800"/>
           </a:xfrm>
           <a:prstGeom prst="rect">
             <a:avLst/>
@@ -4540,14 +4361,14 @@
       </p:sp>
       <p:sp>
         <p:nvSpPr>
-          <p:cNvPr id="98" name="CustomShape 61"/>
+          <p:cNvPr id="97" name="CustomShape 61"/>
           <p:cNvSpPr/>
           <p:nvPr/>
         </p:nvSpPr>
         <p:spPr>
           <a:xfrm>
             <a:off x="5580000" y="2340000"/>
-            <a:ext cx="179280" cy="179280"/>
+            <a:ext cx="178560" cy="178560"/>
           </a:xfrm>
           <a:prstGeom prst="verticalScroll">
             <a:avLst>
@@ -4572,14 +4393,14 @@
       </p:sp>
       <p:sp>
         <p:nvSpPr>
-          <p:cNvPr id="99" name="CustomShape 62"/>
+          <p:cNvPr id="98" name="CustomShape 62"/>
           <p:cNvSpPr/>
           <p:nvPr/>
         </p:nvSpPr>
         <p:spPr>
           <a:xfrm>
             <a:off x="7740000" y="2700000"/>
-            <a:ext cx="179280" cy="179280"/>
+            <a:ext cx="178560" cy="178560"/>
           </a:xfrm>
           <a:prstGeom prst="verticalScroll">
             <a:avLst>
@@ -4604,14 +4425,14 @@
       </p:sp>
       <p:sp>
         <p:nvSpPr>
-          <p:cNvPr id="100" name="CustomShape 63"/>
+          <p:cNvPr id="99" name="CustomShape 63"/>
           <p:cNvSpPr/>
           <p:nvPr/>
         </p:nvSpPr>
         <p:spPr>
           <a:xfrm>
             <a:off x="5760000" y="2318040"/>
-            <a:ext cx="719280" cy="272520"/>
+            <a:ext cx="718560" cy="271800"/>
           </a:xfrm>
           <a:prstGeom prst="rect">
             <a:avLst/>
@@ -4655,14 +4476,14 @@
       </p:sp>
       <p:sp>
         <p:nvSpPr>
-          <p:cNvPr id="101" name="CustomShape 64"/>
+          <p:cNvPr id="100" name="CustomShape 64"/>
           <p:cNvSpPr/>
           <p:nvPr/>
         </p:nvSpPr>
         <p:spPr>
           <a:xfrm>
             <a:off x="7920000" y="2639520"/>
-            <a:ext cx="719280" cy="272520"/>
+            <a:ext cx="718560" cy="271800"/>
           </a:xfrm>
           <a:prstGeom prst="rect">
             <a:avLst/>
@@ -4706,14 +4527,14 @@
       </p:sp>
       <p:sp>
         <p:nvSpPr>
-          <p:cNvPr id="102" name="CustomShape 65"/>
+          <p:cNvPr id="101" name="CustomShape 65"/>
           <p:cNvSpPr/>
           <p:nvPr/>
         </p:nvSpPr>
         <p:spPr>
           <a:xfrm>
             <a:off x="7020000" y="4140000"/>
-            <a:ext cx="1194840" cy="179280"/>
+            <a:ext cx="1194120" cy="178560"/>
           </a:xfrm>
           <a:prstGeom prst="roundRect">
             <a:avLst>
@@ -4769,14 +4590,14 @@
       </p:sp>
       <p:sp>
         <p:nvSpPr>
-          <p:cNvPr id="103" name="CustomShape 66"/>
+          <p:cNvPr id="102" name="CustomShape 66"/>
           <p:cNvSpPr/>
           <p:nvPr/>
         </p:nvSpPr>
         <p:spPr>
           <a:xfrm rot="29400">
-            <a:off x="8278200" y="4135320"/>
-            <a:ext cx="899280" cy="179280"/>
+            <a:off x="8277480" y="4134600"/>
+            <a:ext cx="898560" cy="178560"/>
           </a:xfrm>
           <a:prstGeom prst="roundRect">
             <a:avLst>
@@ -4832,14 +4653,14 @@
       </p:sp>
       <p:sp>
         <p:nvSpPr>
-          <p:cNvPr id="104" name="CustomShape 67"/>
+          <p:cNvPr id="103" name="CustomShape 67"/>
           <p:cNvSpPr/>
           <p:nvPr/>
         </p:nvSpPr>
         <p:spPr>
           <a:xfrm>
             <a:off x="7533360" y="5792400"/>
-            <a:ext cx="3012120" cy="359280"/>
+            <a:ext cx="3011400" cy="358560"/>
           </a:xfrm>
           <a:prstGeom prst="roundRect">
             <a:avLst>
@@ -4895,14 +4716,14 @@
       </p:sp>
       <p:sp>
         <p:nvSpPr>
-          <p:cNvPr id="105" name="CustomShape 68"/>
+          <p:cNvPr id="104" name="CustomShape 68"/>
           <p:cNvSpPr/>
           <p:nvPr/>
         </p:nvSpPr>
         <p:spPr>
           <a:xfrm>
             <a:off x="1431360" y="6152400"/>
-            <a:ext cx="2167920" cy="506880"/>
+            <a:ext cx="2167200" cy="506160"/>
           </a:xfrm>
           <a:prstGeom prst="roundRect">
             <a:avLst>
@@ -4958,14 +4779,14 @@
       </p:sp>
       <p:sp>
         <p:nvSpPr>
-          <p:cNvPr id="106" name="CustomShape 69"/>
+          <p:cNvPr id="105" name="CustomShape 69"/>
           <p:cNvSpPr/>
           <p:nvPr/>
         </p:nvSpPr>
         <p:spPr>
           <a:xfrm>
             <a:off x="1620360" y="5040000"/>
-            <a:ext cx="150840" cy="176400"/>
+            <a:ext cx="150120" cy="175680"/>
           </a:xfrm>
           <a:prstGeom prst="parallelogram">
             <a:avLst>
@@ -4996,14 +4817,14 @@
       </p:sp>
       <p:sp>
         <p:nvSpPr>
-          <p:cNvPr id="107" name="CustomShape 70"/>
+          <p:cNvPr id="106" name="CustomShape 70"/>
           <p:cNvSpPr/>
           <p:nvPr/>
         </p:nvSpPr>
         <p:spPr>
           <a:xfrm>
             <a:off x="1316880" y="5042880"/>
-            <a:ext cx="150840" cy="176400"/>
+            <a:ext cx="150120" cy="175680"/>
           </a:xfrm>
           <a:prstGeom prst="parallelogram">
             <a:avLst>
@@ -5034,14 +4855,14 @@
       </p:sp>
       <p:sp>
         <p:nvSpPr>
-          <p:cNvPr id="108" name="CustomShape 71"/>
+          <p:cNvPr id="107" name="CustomShape 71"/>
           <p:cNvSpPr/>
           <p:nvPr/>
         </p:nvSpPr>
         <p:spPr>
           <a:xfrm>
             <a:off x="3780000" y="5040000"/>
-            <a:ext cx="179280" cy="179280"/>
+            <a:ext cx="178560" cy="178560"/>
           </a:xfrm>
           <a:prstGeom prst="verticalScroll">
             <a:avLst>
@@ -5066,14 +4887,14 @@
       </p:sp>
       <p:sp>
         <p:nvSpPr>
-          <p:cNvPr id="109" name="CustomShape 72"/>
+          <p:cNvPr id="108" name="CustomShape 72"/>
           <p:cNvSpPr/>
           <p:nvPr/>
         </p:nvSpPr>
         <p:spPr>
           <a:xfrm>
             <a:off x="3960000" y="5040000"/>
-            <a:ext cx="1079280" cy="167400"/>
+            <a:ext cx="1078560" cy="166680"/>
           </a:xfrm>
           <a:prstGeom prst="rect">
             <a:avLst/>
@@ -5103,7 +4924,7 @@
               </a:tabLst>
             </a:pPr>
             <a:r>
-              <a:rPr b="0" lang="en-US" sz="1100" spc="-24" strike="noStrike">
+              <a:rPr b="0" lang="fr-FR" sz="1100" spc="-24" strike="noStrike">
                 <a:solidFill>
                   <a:srgbClr val="000000"/>
                 </a:solidFill>
@@ -5120,14 +4941,14 @@
       </p:sp>
       <p:sp>
         <p:nvSpPr>
-          <p:cNvPr id="110" name="CustomShape 73"/>
+          <p:cNvPr id="109" name="CustomShape 73"/>
           <p:cNvSpPr/>
           <p:nvPr/>
         </p:nvSpPr>
         <p:spPr>
           <a:xfrm>
             <a:off x="5400000" y="5040000"/>
-            <a:ext cx="179280" cy="179280"/>
+            <a:ext cx="178560" cy="178560"/>
           </a:xfrm>
           <a:custGeom>
             <a:avLst/>
@@ -5173,14 +4994,14 @@
       </p:sp>
       <p:sp>
         <p:nvSpPr>
-          <p:cNvPr id="111" name="CustomShape 74"/>
+          <p:cNvPr id="110" name="CustomShape 74"/>
           <p:cNvSpPr/>
           <p:nvPr/>
         </p:nvSpPr>
         <p:spPr>
           <a:xfrm>
             <a:off x="5580000" y="5051880"/>
-            <a:ext cx="1079280" cy="167400"/>
+            <a:ext cx="1078560" cy="166680"/>
           </a:xfrm>
           <a:prstGeom prst="rect">
             <a:avLst/>
@@ -5210,14 +5031,14 @@
               </a:tabLst>
             </a:pPr>
             <a:r>
-              <a:rPr b="0" lang="en-US" sz="1100" spc="-24" strike="noStrike">
+              <a:rPr b="0" lang="fr-FR" sz="1100" spc="-24" strike="noStrike">
                 <a:solidFill>
                   <a:srgbClr val="000000"/>
                 </a:solidFill>
                 <a:latin typeface="MV Boli"/>
                 <a:ea typeface="DejaVu Sans"/>
               </a:rPr>
-              <a:t>Equipe Rep’Aero</a:t>
+              <a:t>Équipe Rep’Aero</a:t>
             </a:r>
             <a:endParaRPr b="0" lang="fr-FR" sz="1100" spc="-1" strike="noStrike">
               <a:latin typeface="Arial"/>
@@ -5227,14 +5048,14 @@
       </p:sp>
       <p:sp>
         <p:nvSpPr>
-          <p:cNvPr id="112" name="CustomShape 75"/>
+          <p:cNvPr id="111" name="CustomShape 75"/>
           <p:cNvSpPr/>
           <p:nvPr/>
         </p:nvSpPr>
         <p:spPr>
           <a:xfrm>
             <a:off x="4140000" y="1800000"/>
-            <a:ext cx="179280" cy="179280"/>
+            <a:ext cx="178560" cy="178560"/>
           </a:xfrm>
           <a:custGeom>
             <a:avLst/>
@@ -5298,14 +5119,14 @@
       </p:sp>
       <p:sp>
         <p:nvSpPr>
-          <p:cNvPr id="113" name="CustomShape 76"/>
+          <p:cNvPr id="112" name="CustomShape 76"/>
           <p:cNvSpPr/>
           <p:nvPr/>
         </p:nvSpPr>
         <p:spPr>
           <a:xfrm>
             <a:off x="5940000" y="2138040"/>
-            <a:ext cx="179280" cy="179280"/>
+            <a:ext cx="178560" cy="178560"/>
           </a:xfrm>
           <a:custGeom>
             <a:avLst/>
@@ -5369,14 +5190,14 @@
       </p:sp>
       <p:sp>
         <p:nvSpPr>
-          <p:cNvPr id="114" name="CustomShape 77"/>
+          <p:cNvPr id="113" name="CustomShape 77"/>
           <p:cNvSpPr/>
           <p:nvPr/>
         </p:nvSpPr>
         <p:spPr>
           <a:xfrm>
             <a:off x="7920000" y="2459520"/>
-            <a:ext cx="179280" cy="179280"/>
+            <a:ext cx="178560" cy="178560"/>
           </a:xfrm>
           <a:custGeom>
             <a:avLst/>
@@ -5440,14 +5261,14 @@
       </p:sp>
       <p:sp>
         <p:nvSpPr>
-          <p:cNvPr id="115" name="CustomShape 78"/>
+          <p:cNvPr id="114" name="CustomShape 78"/>
           <p:cNvSpPr/>
           <p:nvPr/>
         </p:nvSpPr>
         <p:spPr>
           <a:xfrm>
             <a:off x="4320000" y="1800000"/>
-            <a:ext cx="1079280" cy="272520"/>
+            <a:ext cx="1078560" cy="271800"/>
           </a:xfrm>
           <a:prstGeom prst="rect">
             <a:avLst/>
@@ -5491,14 +5312,14 @@
       </p:sp>
       <p:sp>
         <p:nvSpPr>
-          <p:cNvPr id="116" name="CustomShape 79"/>
+          <p:cNvPr id="115" name="CustomShape 79"/>
           <p:cNvSpPr/>
           <p:nvPr/>
         </p:nvSpPr>
         <p:spPr>
           <a:xfrm>
             <a:off x="7020000" y="5040000"/>
-            <a:ext cx="179280" cy="179280"/>
+            <a:ext cx="178560" cy="178560"/>
           </a:xfrm>
           <a:custGeom>
             <a:avLst/>
@@ -5562,14 +5383,14 @@
       </p:sp>
       <p:sp>
         <p:nvSpPr>
-          <p:cNvPr id="117" name="CustomShape 80"/>
+          <p:cNvPr id="116" name="CustomShape 80"/>
           <p:cNvSpPr/>
           <p:nvPr/>
         </p:nvSpPr>
         <p:spPr>
           <a:xfrm>
             <a:off x="7134480" y="5040000"/>
-            <a:ext cx="1684800" cy="272520"/>
+            <a:ext cx="1684080" cy="271800"/>
           </a:xfrm>
           <a:prstGeom prst="rect">
             <a:avLst/>
@@ -5603,7 +5424,7 @@
                 <a:latin typeface="MV Boli"/>
                 <a:ea typeface="DejaVu Sans"/>
               </a:rPr>
-              <a:t>Ingenieur systeme</a:t>
+              <a:t>Ingénieur système</a:t>
             </a:r>
             <a:endParaRPr b="0" lang="fr-FR" sz="900" spc="-1" strike="noStrike">
               <a:latin typeface="Arial"/>
@@ -5613,14 +5434,14 @@
       </p:sp>
       <p:sp>
         <p:nvSpPr>
-          <p:cNvPr id="118" name="CustomShape 81"/>
+          <p:cNvPr id="117" name="CustomShape 81"/>
           <p:cNvSpPr/>
           <p:nvPr/>
         </p:nvSpPr>
         <p:spPr>
           <a:xfrm>
             <a:off x="6120000" y="2138040"/>
-            <a:ext cx="1079280" cy="272520"/>
+            <a:ext cx="1078560" cy="271800"/>
           </a:xfrm>
           <a:prstGeom prst="rect">
             <a:avLst/>
@@ -5664,14 +5485,14 @@
       </p:sp>
       <p:sp>
         <p:nvSpPr>
-          <p:cNvPr id="119" name="CustomShape 82"/>
+          <p:cNvPr id="118" name="CustomShape 82"/>
           <p:cNvSpPr/>
           <p:nvPr/>
         </p:nvSpPr>
         <p:spPr>
           <a:xfrm>
             <a:off x="8100000" y="2426760"/>
-            <a:ext cx="1079280" cy="272520"/>
+            <a:ext cx="1078560" cy="271800"/>
           </a:xfrm>
           <a:prstGeom prst="rect">
             <a:avLst/>

</xml_diff>